<commit_message>
An der präsentation gearbeitet
</commit_message>
<xml_diff>
--- a/Projektarbeit.pptx
+++ b/Projektarbeit.pptx
@@ -9,6 +9,8 @@
     <p:sldId id="257" r:id="rId3"/>
     <p:sldId id="258" r:id="rId4"/>
     <p:sldId id="259" r:id="rId5"/>
+    <p:sldId id="260" r:id="rId6"/>
+    <p:sldId id="261" r:id="rId7"/>
   </p:sldIdLst>
   <p:sldSz cx="9144000" cy="6858000" type="screen4x3"/>
   <p:notesSz cx="6858000" cy="9144000"/>
@@ -346,7 +348,7 @@
           <a:p>
             <a:fld id="{33548BFF-153A-4E7C-BBF9-39DDD51A52AC}" type="datetimeFigureOut">
               <a:rPr lang="de-CH" smtClean="0"/>
-              <a:t>16.06.2013</a:t>
+              <a:t>17.06.2013</a:t>
             </a:fld>
             <a:endParaRPr lang="de-CH"/>
           </a:p>
@@ -624,7 +626,7 @@
           <a:p>
             <a:fld id="{33548BFF-153A-4E7C-BBF9-39DDD51A52AC}" type="datetimeFigureOut">
               <a:rPr lang="de-CH" smtClean="0"/>
-              <a:t>16.06.2013</a:t>
+              <a:t>17.06.2013</a:t>
             </a:fld>
             <a:endParaRPr lang="de-CH"/>
           </a:p>
@@ -847,7 +849,7 @@
           <a:p>
             <a:fld id="{33548BFF-153A-4E7C-BBF9-39DDD51A52AC}" type="datetimeFigureOut">
               <a:rPr lang="de-CH" smtClean="0"/>
-              <a:t>16.06.2013</a:t>
+              <a:t>17.06.2013</a:t>
             </a:fld>
             <a:endParaRPr lang="de-CH"/>
           </a:p>
@@ -1042,7 +1044,7 @@
           <a:p>
             <a:fld id="{33548BFF-153A-4E7C-BBF9-39DDD51A52AC}" type="datetimeFigureOut">
               <a:rPr lang="de-CH" smtClean="0"/>
-              <a:t>16.06.2013</a:t>
+              <a:t>17.06.2013</a:t>
             </a:fld>
             <a:endParaRPr lang="de-CH"/>
           </a:p>
@@ -1322,7 +1324,7 @@
           <a:p>
             <a:fld id="{33548BFF-153A-4E7C-BBF9-39DDD51A52AC}" type="datetimeFigureOut">
               <a:rPr lang="de-CH" smtClean="0"/>
-              <a:t>16.06.2013</a:t>
+              <a:t>17.06.2013</a:t>
             </a:fld>
             <a:endParaRPr lang="de-CH"/>
           </a:p>
@@ -1795,7 +1797,7 @@
           <a:p>
             <a:fld id="{33548BFF-153A-4E7C-BBF9-39DDD51A52AC}" type="datetimeFigureOut">
               <a:rPr lang="de-CH" smtClean="0"/>
-              <a:t>16.06.2013</a:t>
+              <a:t>17.06.2013</a:t>
             </a:fld>
             <a:endParaRPr lang="de-CH"/>
           </a:p>
@@ -2250,7 +2252,7 @@
           <a:p>
             <a:fld id="{33548BFF-153A-4E7C-BBF9-39DDD51A52AC}" type="datetimeFigureOut">
               <a:rPr lang="de-CH" smtClean="0"/>
-              <a:t>16.06.2013</a:t>
+              <a:t>17.06.2013</a:t>
             </a:fld>
             <a:endParaRPr lang="de-CH"/>
           </a:p>
@@ -2388,7 +2390,7 @@
           <a:p>
             <a:fld id="{33548BFF-153A-4E7C-BBF9-39DDD51A52AC}" type="datetimeFigureOut">
               <a:rPr lang="de-CH" smtClean="0"/>
-              <a:t>16.06.2013</a:t>
+              <a:t>17.06.2013</a:t>
             </a:fld>
             <a:endParaRPr lang="de-CH"/>
           </a:p>
@@ -2549,7 +2551,7 @@
           <a:p>
             <a:fld id="{33548BFF-153A-4E7C-BBF9-39DDD51A52AC}" type="datetimeFigureOut">
               <a:rPr lang="de-CH" smtClean="0"/>
-              <a:t>16.06.2013</a:t>
+              <a:t>17.06.2013</a:t>
             </a:fld>
             <a:endParaRPr lang="de-CH"/>
           </a:p>
@@ -2943,7 +2945,7 @@
           <a:p>
             <a:fld id="{33548BFF-153A-4E7C-BBF9-39DDD51A52AC}" type="datetimeFigureOut">
               <a:rPr lang="de-CH" smtClean="0"/>
-              <a:t>16.06.2013</a:t>
+              <a:t>17.06.2013</a:t>
             </a:fld>
             <a:endParaRPr lang="de-CH"/>
           </a:p>
@@ -3343,7 +3345,7 @@
           <a:p>
             <a:fld id="{33548BFF-153A-4E7C-BBF9-39DDD51A52AC}" type="datetimeFigureOut">
               <a:rPr lang="de-CH" smtClean="0"/>
-              <a:t>16.06.2013</a:t>
+              <a:t>17.06.2013</a:t>
             </a:fld>
             <a:endParaRPr lang="de-CH"/>
           </a:p>
@@ -3553,7 +3555,7 @@
           <a:p>
             <a:fld id="{33548BFF-153A-4E7C-BBF9-39DDD51A52AC}" type="datetimeFigureOut">
               <a:rPr lang="de-CH" smtClean="0"/>
-              <a:t>16.06.2013</a:t>
+              <a:t>17.06.2013</a:t>
             </a:fld>
             <a:endParaRPr lang="de-CH"/>
           </a:p>
@@ -4013,6 +4015,13 @@
   <p:clrMapOvr>
     <a:masterClrMapping/>
   </p:clrMapOvr>
+  <p:timing>
+    <p:tnLst>
+      <p:par>
+        <p:cTn id="1" dur="indefinite" restart="never" nodeType="tmRoot"/>
+      </p:par>
+    </p:tnLst>
+  </p:timing>
 </p:sld>
 </file>
 
@@ -4107,6 +4116,170 @@
           </a:p>
         </p:txBody>
       </p:sp>
+      <p:pic>
+        <p:nvPicPr>
+          <p:cNvPr id="1027" name="Picture 3" descr="C:\Private\Jens\Programing\SchuelerOffice\SchuelerOffice\res\Chopper.png"/>
+          <p:cNvPicPr>
+            <a:picLocks noChangeAspect="1" noChangeArrowheads="1"/>
+          </p:cNvPicPr>
+          <p:nvPr/>
+        </p:nvPicPr>
+        <p:blipFill>
+          <a:blip r:embed="rId2" cstate="print">
+            <a:extLst>
+              <a:ext uri="{28A0092B-C50C-407E-A947-70E740481C1C}">
+                <a14:useLocalDpi xmlns:a14="http://schemas.microsoft.com/office/drawing/2010/main" val="0"/>
+              </a:ext>
+            </a:extLst>
+          </a:blip>
+          <a:srcRect/>
+          <a:stretch>
+            <a:fillRect/>
+          </a:stretch>
+        </p:blipFill>
+        <p:spPr bwMode="auto">
+          <a:xfrm>
+            <a:off x="6444208" y="332656"/>
+            <a:ext cx="2473180" cy="1648939"/>
+          </a:xfrm>
+          <a:prstGeom prst="rect">
+            <a:avLst/>
+          </a:prstGeom>
+          <a:noFill/>
+          <a:extLst>
+            <a:ext uri="{909E8E84-426E-40DD-AFC4-6F175D3DCCD1}">
+              <a14:hiddenFill xmlns:a14="http://schemas.microsoft.com/office/drawing/2010/main">
+                <a:solidFill>
+                  <a:srgbClr val="FFFFFF"/>
+                </a:solidFill>
+              </a14:hiddenFill>
+            </a:ext>
+          </a:extLst>
+        </p:spPr>
+      </p:pic>
+      <p:pic>
+        <p:nvPicPr>
+          <p:cNvPr id="1028" name="Picture 4" descr="C:\Private\Jens\Programing\SchuelerOffice\SchuelerOffice\res\Quadcopter.png"/>
+          <p:cNvPicPr>
+            <a:picLocks noChangeAspect="1" noChangeArrowheads="1"/>
+          </p:cNvPicPr>
+          <p:nvPr/>
+        </p:nvPicPr>
+        <p:blipFill>
+          <a:blip r:embed="rId3">
+            <a:extLst>
+              <a:ext uri="{28A0092B-C50C-407E-A947-70E740481C1C}">
+                <a14:useLocalDpi xmlns:a14="http://schemas.microsoft.com/office/drawing/2010/main" val="0"/>
+              </a:ext>
+            </a:extLst>
+          </a:blip>
+          <a:srcRect/>
+          <a:stretch>
+            <a:fillRect/>
+          </a:stretch>
+        </p:blipFill>
+        <p:spPr bwMode="auto">
+          <a:xfrm>
+            <a:off x="6782684" y="4005064"/>
+            <a:ext cx="2134704" cy="1376884"/>
+          </a:xfrm>
+          <a:prstGeom prst="rect">
+            <a:avLst/>
+          </a:prstGeom>
+          <a:noFill/>
+          <a:extLst>
+            <a:ext uri="{909E8E84-426E-40DD-AFC4-6F175D3DCCD1}">
+              <a14:hiddenFill xmlns:a14="http://schemas.microsoft.com/office/drawing/2010/main">
+                <a:solidFill>
+                  <a:srgbClr val="FFFFFF"/>
+                </a:solidFill>
+              </a14:hiddenFill>
+            </a:ext>
+          </a:extLst>
+        </p:spPr>
+      </p:pic>
+      <p:pic>
+        <p:nvPicPr>
+          <p:cNvPr id="1029" name="Picture 5" descr="C:\Private\Jens\Programing\SchuelerOffice\SchuelerOffice\res\Robot.png"/>
+          <p:cNvPicPr>
+            <a:picLocks noChangeAspect="1" noChangeArrowheads="1"/>
+          </p:cNvPicPr>
+          <p:nvPr/>
+        </p:nvPicPr>
+        <p:blipFill>
+          <a:blip r:embed="rId4" cstate="print">
+            <a:extLst>
+              <a:ext uri="{28A0092B-C50C-407E-A947-70E740481C1C}">
+                <a14:useLocalDpi xmlns:a14="http://schemas.microsoft.com/office/drawing/2010/main" val="0"/>
+              </a:ext>
+            </a:extLst>
+          </a:blip>
+          <a:srcRect/>
+          <a:stretch>
+            <a:fillRect/>
+          </a:stretch>
+        </p:blipFill>
+        <p:spPr bwMode="auto">
+          <a:xfrm>
+            <a:off x="3491880" y="99289"/>
+            <a:ext cx="3154379" cy="3277005"/>
+          </a:xfrm>
+          <a:prstGeom prst="rect">
+            <a:avLst/>
+          </a:prstGeom>
+          <a:noFill/>
+          <a:extLst>
+            <a:ext uri="{909E8E84-426E-40DD-AFC4-6F175D3DCCD1}">
+              <a14:hiddenFill xmlns:a14="http://schemas.microsoft.com/office/drawing/2010/main">
+                <a:solidFill>
+                  <a:srgbClr val="FFFFFF"/>
+                </a:solidFill>
+              </a14:hiddenFill>
+            </a:ext>
+          </a:extLst>
+        </p:spPr>
+      </p:pic>
+      <p:pic>
+        <p:nvPicPr>
+          <p:cNvPr id="1030" name="Picture 6" descr="C:\Private\Jens\Programing\SchuelerOffice\SchuelerOffice\res\20130617_144507.jpg"/>
+          <p:cNvPicPr>
+            <a:picLocks noChangeAspect="1" noChangeArrowheads="1"/>
+          </p:cNvPicPr>
+          <p:nvPr/>
+        </p:nvPicPr>
+        <p:blipFill>
+          <a:blip r:embed="rId5" cstate="print">
+            <a:extLst>
+              <a:ext uri="{28A0092B-C50C-407E-A947-70E740481C1C}">
+                <a14:useLocalDpi xmlns:a14="http://schemas.microsoft.com/office/drawing/2010/main" val="0"/>
+              </a:ext>
+            </a:extLst>
+          </a:blip>
+          <a:srcRect/>
+          <a:stretch>
+            <a:fillRect/>
+          </a:stretch>
+        </p:blipFill>
+        <p:spPr bwMode="auto">
+          <a:xfrm>
+            <a:off x="179512" y="3356992"/>
+            <a:ext cx="4104456" cy="3078342"/>
+          </a:xfrm>
+          <a:prstGeom prst="rect">
+            <a:avLst/>
+          </a:prstGeom>
+          <a:noFill/>
+          <a:extLst>
+            <a:ext uri="{909E8E84-426E-40DD-AFC4-6F175D3DCCD1}">
+              <a14:hiddenFill xmlns:a14="http://schemas.microsoft.com/office/drawing/2010/main">
+                <a:solidFill>
+                  <a:srgbClr val="FFFFFF"/>
+                </a:solidFill>
+              </a14:hiddenFill>
+            </a:ext>
+          </a:extLst>
+        </p:spPr>
+      </p:pic>
     </p:spTree>
     <p:extLst>
       <p:ext uri="{BB962C8B-B14F-4D97-AF65-F5344CB8AC3E}">
@@ -4117,6 +4290,13 @@
   <p:clrMapOvr>
     <a:masterClrMapping/>
   </p:clrMapOvr>
+  <p:timing>
+    <p:tnLst>
+      <p:par>
+        <p:cTn id="1" dur="indefinite" restart="never" nodeType="tmRoot"/>
+      </p:par>
+    </p:tnLst>
+  </p:timing>
 </p:sld>
 </file>
 
@@ -4277,6 +4457,88 @@
           </a:p>
         </p:txBody>
       </p:sp>
+      <p:pic>
+        <p:nvPicPr>
+          <p:cNvPr id="2050" name="Picture 2" descr="C:\Private\Jens\Programing\SchuelerOffice\SchuelerOffice\res\DafuqForm.png"/>
+          <p:cNvPicPr>
+            <a:picLocks noChangeAspect="1" noChangeArrowheads="1"/>
+          </p:cNvPicPr>
+          <p:nvPr/>
+        </p:nvPicPr>
+        <p:blipFill>
+          <a:blip r:embed="rId2">
+            <a:extLst>
+              <a:ext uri="{28A0092B-C50C-407E-A947-70E740481C1C}">
+                <a14:useLocalDpi xmlns:a14="http://schemas.microsoft.com/office/drawing/2010/main" val="0"/>
+              </a:ext>
+            </a:extLst>
+          </a:blip>
+          <a:srcRect/>
+          <a:stretch>
+            <a:fillRect/>
+          </a:stretch>
+        </p:blipFill>
+        <p:spPr bwMode="auto">
+          <a:xfrm>
+            <a:off x="3416052" y="1556792"/>
+            <a:ext cx="4025432" cy="3380581"/>
+          </a:xfrm>
+          <a:prstGeom prst="rect">
+            <a:avLst/>
+          </a:prstGeom>
+          <a:noFill/>
+          <a:extLst>
+            <a:ext uri="{909E8E84-426E-40DD-AFC4-6F175D3DCCD1}">
+              <a14:hiddenFill xmlns:a14="http://schemas.microsoft.com/office/drawing/2010/main">
+                <a:solidFill>
+                  <a:srgbClr val="FFFFFF"/>
+                </a:solidFill>
+              </a14:hiddenFill>
+            </a:ext>
+          </a:extLst>
+        </p:spPr>
+      </p:pic>
+      <p:pic>
+        <p:nvPicPr>
+          <p:cNvPr id="2051" name="Picture 3" descr="C:\Private\Jens\Programing\SchuelerOffice\SchuelerOffice\res\GoodForm.png"/>
+          <p:cNvPicPr>
+            <a:picLocks noChangeAspect="1" noChangeArrowheads="1"/>
+          </p:cNvPicPr>
+          <p:nvPr/>
+        </p:nvPicPr>
+        <p:blipFill>
+          <a:blip r:embed="rId3">
+            <a:extLst>
+              <a:ext uri="{28A0092B-C50C-407E-A947-70E740481C1C}">
+                <a14:useLocalDpi xmlns:a14="http://schemas.microsoft.com/office/drawing/2010/main" val="0"/>
+              </a:ext>
+            </a:extLst>
+          </a:blip>
+          <a:srcRect/>
+          <a:stretch>
+            <a:fillRect/>
+          </a:stretch>
+        </p:blipFill>
+        <p:spPr bwMode="auto">
+          <a:xfrm>
+            <a:off x="683568" y="1700808"/>
+            <a:ext cx="7754938" cy="4562475"/>
+          </a:xfrm>
+          <a:prstGeom prst="rect">
+            <a:avLst/>
+          </a:prstGeom>
+          <a:noFill/>
+          <a:extLst>
+            <a:ext uri="{909E8E84-426E-40DD-AFC4-6F175D3DCCD1}">
+              <a14:hiddenFill xmlns:a14="http://schemas.microsoft.com/office/drawing/2010/main">
+                <a:solidFill>
+                  <a:srgbClr val="FFFFFF"/>
+                </a:solidFill>
+              </a14:hiddenFill>
+            </a:ext>
+          </a:extLst>
+        </p:spPr>
+      </p:pic>
     </p:spTree>
     <p:extLst>
       <p:ext uri="{BB962C8B-B14F-4D97-AF65-F5344CB8AC3E}">
@@ -4290,7 +4552,355 @@
   <p:timing>
     <p:tnLst>
       <p:par>
-        <p:cTn id="1" dur="indefinite" restart="never" nodeType="tmRoot"/>
+        <p:cTn id="1" dur="indefinite" restart="never" nodeType="tmRoot">
+          <p:childTnLst>
+            <p:seq concurrent="1" nextAc="seek">
+              <p:cTn id="2" dur="indefinite" nodeType="mainSeq">
+                <p:childTnLst>
+                  <p:par>
+                    <p:cTn id="3" fill="hold">
+                      <p:stCondLst>
+                        <p:cond delay="indefinite"/>
+                      </p:stCondLst>
+                      <p:childTnLst>
+                        <p:par>
+                          <p:cTn id="4" fill="hold">
+                            <p:stCondLst>
+                              <p:cond delay="0"/>
+                            </p:stCondLst>
+                            <p:childTnLst>
+                              <p:par>
+                                <p:cTn id="5" presetID="2" presetClass="entr" presetSubtype="8" fill="hold" nodeType="clickEffect">
+                                  <p:stCondLst>
+                                    <p:cond delay="0"/>
+                                  </p:stCondLst>
+                                  <p:childTnLst>
+                                    <p:set>
+                                      <p:cBhvr>
+                                        <p:cTn id="6" dur="1" fill="hold">
+                                          <p:stCondLst>
+                                            <p:cond delay="0"/>
+                                          </p:stCondLst>
+                                        </p:cTn>
+                                        <p:tgtEl>
+                                          <p:spTgt spid="2050"/>
+                                        </p:tgtEl>
+                                        <p:attrNameLst>
+                                          <p:attrName>style.visibility</p:attrName>
+                                        </p:attrNameLst>
+                                      </p:cBhvr>
+                                      <p:to>
+                                        <p:strVal val="visible"/>
+                                      </p:to>
+                                    </p:set>
+                                    <p:anim calcmode="lin" valueType="num">
+                                      <p:cBhvr additive="base">
+                                        <p:cTn id="7" dur="500" fill="hold"/>
+                                        <p:tgtEl>
+                                          <p:spTgt spid="2050"/>
+                                        </p:tgtEl>
+                                        <p:attrNameLst>
+                                          <p:attrName>ppt_x</p:attrName>
+                                        </p:attrNameLst>
+                                      </p:cBhvr>
+                                      <p:tavLst>
+                                        <p:tav tm="0">
+                                          <p:val>
+                                            <p:strVal val="0-#ppt_w/2"/>
+                                          </p:val>
+                                        </p:tav>
+                                        <p:tav tm="100000">
+                                          <p:val>
+                                            <p:strVal val="#ppt_x"/>
+                                          </p:val>
+                                        </p:tav>
+                                      </p:tavLst>
+                                    </p:anim>
+                                    <p:anim calcmode="lin" valueType="num">
+                                      <p:cBhvr additive="base">
+                                        <p:cTn id="8" dur="500" fill="hold"/>
+                                        <p:tgtEl>
+                                          <p:spTgt spid="2050"/>
+                                        </p:tgtEl>
+                                        <p:attrNameLst>
+                                          <p:attrName>ppt_y</p:attrName>
+                                        </p:attrNameLst>
+                                      </p:cBhvr>
+                                      <p:tavLst>
+                                        <p:tav tm="0">
+                                          <p:val>
+                                            <p:strVal val="#ppt_y"/>
+                                          </p:val>
+                                        </p:tav>
+                                        <p:tav tm="100000">
+                                          <p:val>
+                                            <p:strVal val="#ppt_y"/>
+                                          </p:val>
+                                        </p:tav>
+                                      </p:tavLst>
+                                    </p:anim>
+                                  </p:childTnLst>
+                                </p:cTn>
+                              </p:par>
+                            </p:childTnLst>
+                          </p:cTn>
+                        </p:par>
+                      </p:childTnLst>
+                    </p:cTn>
+                  </p:par>
+                  <p:par>
+                    <p:cTn id="9" fill="hold">
+                      <p:stCondLst>
+                        <p:cond delay="indefinite"/>
+                      </p:stCondLst>
+                      <p:childTnLst>
+                        <p:par>
+                          <p:cTn id="10" fill="hold">
+                            <p:stCondLst>
+                              <p:cond delay="0"/>
+                            </p:stCondLst>
+                            <p:childTnLst>
+                              <p:par>
+                                <p:cTn id="11" presetID="2" presetClass="exit" presetSubtype="2" fill="hold" nodeType="clickEffect">
+                                  <p:stCondLst>
+                                    <p:cond delay="0"/>
+                                  </p:stCondLst>
+                                  <p:childTnLst>
+                                    <p:anim calcmode="lin" valueType="num">
+                                      <p:cBhvr additive="base">
+                                        <p:cTn id="12" dur="500"/>
+                                        <p:tgtEl>
+                                          <p:spTgt spid="2050"/>
+                                        </p:tgtEl>
+                                        <p:attrNameLst>
+                                          <p:attrName>ppt_x</p:attrName>
+                                        </p:attrNameLst>
+                                      </p:cBhvr>
+                                      <p:tavLst>
+                                        <p:tav tm="0">
+                                          <p:val>
+                                            <p:strVal val="ppt_x"/>
+                                          </p:val>
+                                        </p:tav>
+                                        <p:tav tm="100000">
+                                          <p:val>
+                                            <p:strVal val="1+ppt_w/2"/>
+                                          </p:val>
+                                        </p:tav>
+                                      </p:tavLst>
+                                    </p:anim>
+                                    <p:anim calcmode="lin" valueType="num">
+                                      <p:cBhvr additive="base">
+                                        <p:cTn id="13" dur="500"/>
+                                        <p:tgtEl>
+                                          <p:spTgt spid="2050"/>
+                                        </p:tgtEl>
+                                        <p:attrNameLst>
+                                          <p:attrName>ppt_y</p:attrName>
+                                        </p:attrNameLst>
+                                      </p:cBhvr>
+                                      <p:tavLst>
+                                        <p:tav tm="0">
+                                          <p:val>
+                                            <p:strVal val="ppt_y"/>
+                                          </p:val>
+                                        </p:tav>
+                                        <p:tav tm="100000">
+                                          <p:val>
+                                            <p:strVal val="ppt_y"/>
+                                          </p:val>
+                                        </p:tav>
+                                      </p:tavLst>
+                                    </p:anim>
+                                    <p:set>
+                                      <p:cBhvr>
+                                        <p:cTn id="14" dur="1" fill="hold">
+                                          <p:stCondLst>
+                                            <p:cond delay="499"/>
+                                          </p:stCondLst>
+                                        </p:cTn>
+                                        <p:tgtEl>
+                                          <p:spTgt spid="2050"/>
+                                        </p:tgtEl>
+                                        <p:attrNameLst>
+                                          <p:attrName>style.visibility</p:attrName>
+                                        </p:attrNameLst>
+                                      </p:cBhvr>
+                                      <p:to>
+                                        <p:strVal val="hidden"/>
+                                      </p:to>
+                                    </p:set>
+                                  </p:childTnLst>
+                                </p:cTn>
+                              </p:par>
+                            </p:childTnLst>
+                          </p:cTn>
+                        </p:par>
+                        <p:par>
+                          <p:cTn id="15" fill="hold">
+                            <p:stCondLst>
+                              <p:cond delay="500"/>
+                            </p:stCondLst>
+                            <p:childTnLst>
+                              <p:par>
+                                <p:cTn id="16" presetID="42" presetClass="entr" presetSubtype="0" fill="hold" nodeType="afterEffect">
+                                  <p:stCondLst>
+                                    <p:cond delay="0"/>
+                                  </p:stCondLst>
+                                  <p:childTnLst>
+                                    <p:set>
+                                      <p:cBhvr>
+                                        <p:cTn id="17" dur="1" fill="hold">
+                                          <p:stCondLst>
+                                            <p:cond delay="0"/>
+                                          </p:stCondLst>
+                                        </p:cTn>
+                                        <p:tgtEl>
+                                          <p:spTgt spid="2051"/>
+                                        </p:tgtEl>
+                                        <p:attrNameLst>
+                                          <p:attrName>style.visibility</p:attrName>
+                                        </p:attrNameLst>
+                                      </p:cBhvr>
+                                      <p:to>
+                                        <p:strVal val="visible"/>
+                                      </p:to>
+                                    </p:set>
+                                    <p:animEffect transition="in" filter="fade">
+                                      <p:cBhvr>
+                                        <p:cTn id="18" dur="1000"/>
+                                        <p:tgtEl>
+                                          <p:spTgt spid="2051"/>
+                                        </p:tgtEl>
+                                      </p:cBhvr>
+                                    </p:animEffect>
+                                    <p:anim calcmode="lin" valueType="num">
+                                      <p:cBhvr>
+                                        <p:cTn id="19" dur="1000" fill="hold"/>
+                                        <p:tgtEl>
+                                          <p:spTgt spid="2051"/>
+                                        </p:tgtEl>
+                                        <p:attrNameLst>
+                                          <p:attrName>ppt_x</p:attrName>
+                                        </p:attrNameLst>
+                                      </p:cBhvr>
+                                      <p:tavLst>
+                                        <p:tav tm="0">
+                                          <p:val>
+                                            <p:strVal val="#ppt_x"/>
+                                          </p:val>
+                                        </p:tav>
+                                        <p:tav tm="100000">
+                                          <p:val>
+                                            <p:strVal val="#ppt_x"/>
+                                          </p:val>
+                                        </p:tav>
+                                      </p:tavLst>
+                                    </p:anim>
+                                    <p:anim calcmode="lin" valueType="num">
+                                      <p:cBhvr>
+                                        <p:cTn id="20" dur="1000" fill="hold"/>
+                                        <p:tgtEl>
+                                          <p:spTgt spid="2051"/>
+                                        </p:tgtEl>
+                                        <p:attrNameLst>
+                                          <p:attrName>ppt_y</p:attrName>
+                                        </p:attrNameLst>
+                                      </p:cBhvr>
+                                      <p:tavLst>
+                                        <p:tav tm="0">
+                                          <p:val>
+                                            <p:strVal val="#ppt_y+.1"/>
+                                          </p:val>
+                                        </p:tav>
+                                        <p:tav tm="100000">
+                                          <p:val>
+                                            <p:strVal val="#ppt_y"/>
+                                          </p:val>
+                                        </p:tav>
+                                      </p:tavLst>
+                                    </p:anim>
+                                  </p:childTnLst>
+                                </p:cTn>
+                              </p:par>
+                            </p:childTnLst>
+                          </p:cTn>
+                        </p:par>
+                      </p:childTnLst>
+                    </p:cTn>
+                  </p:par>
+                  <p:par>
+                    <p:cTn id="21" fill="hold">
+                      <p:stCondLst>
+                        <p:cond delay="indefinite"/>
+                      </p:stCondLst>
+                      <p:childTnLst>
+                        <p:par>
+                          <p:cTn id="22" fill="hold">
+                            <p:stCondLst>
+                              <p:cond delay="0"/>
+                            </p:stCondLst>
+                            <p:childTnLst>
+                              <p:par>
+                                <p:cTn id="23" presetID="10" presetClass="exit" presetSubtype="0" fill="hold" nodeType="clickEffect">
+                                  <p:stCondLst>
+                                    <p:cond delay="0"/>
+                                  </p:stCondLst>
+                                  <p:childTnLst>
+                                    <p:animEffect transition="out" filter="fade">
+                                      <p:cBhvr>
+                                        <p:cTn id="24" dur="500"/>
+                                        <p:tgtEl>
+                                          <p:spTgt spid="2051"/>
+                                        </p:tgtEl>
+                                      </p:cBhvr>
+                                    </p:animEffect>
+                                    <p:set>
+                                      <p:cBhvr>
+                                        <p:cTn id="25" dur="1" fill="hold">
+                                          <p:stCondLst>
+                                            <p:cond delay="499"/>
+                                          </p:stCondLst>
+                                        </p:cTn>
+                                        <p:tgtEl>
+                                          <p:spTgt spid="2051"/>
+                                        </p:tgtEl>
+                                        <p:attrNameLst>
+                                          <p:attrName>style.visibility</p:attrName>
+                                        </p:attrNameLst>
+                                      </p:cBhvr>
+                                      <p:to>
+                                        <p:strVal val="hidden"/>
+                                      </p:to>
+                                    </p:set>
+                                  </p:childTnLst>
+                                </p:cTn>
+                              </p:par>
+                            </p:childTnLst>
+                          </p:cTn>
+                        </p:par>
+                      </p:childTnLst>
+                    </p:cTn>
+                  </p:par>
+                </p:childTnLst>
+              </p:cTn>
+              <p:prevCondLst>
+                <p:cond evt="onPrev" delay="0">
+                  <p:tgtEl>
+                    <p:sldTgt/>
+                  </p:tgtEl>
+                </p:cond>
+              </p:prevCondLst>
+              <p:nextCondLst>
+                <p:cond evt="onNext" delay="0">
+                  <p:tgtEl>
+                    <p:sldTgt/>
+                  </p:tgtEl>
+                </p:cond>
+              </p:nextCondLst>
+            </p:seq>
+          </p:childTnLst>
+        </p:cTn>
       </p:par>
     </p:tnLst>
   </p:timing>
@@ -4334,8 +4944,28 @@
               <a:buChar char="•"/>
             </a:pPr>
             <a:r>
-              <a:rPr lang="de-CH" smtClean="0"/>
+              <a:rPr lang="de-CH" dirty="0" smtClean="0"/>
               <a:t>Zielnote berechnen</a:t>
+            </a:r>
+          </a:p>
+          <a:p>
+            <a:pPr marL="285750" indent="-285750">
+              <a:buFont typeface="Arial" pitchFamily="34" charset="0"/>
+              <a:buChar char="•"/>
+            </a:pPr>
+            <a:r>
+              <a:rPr lang="de-CH" dirty="0" smtClean="0"/>
+              <a:t>Grafik</a:t>
+            </a:r>
+          </a:p>
+          <a:p>
+            <a:pPr marL="285750" indent="-285750">
+              <a:buFont typeface="Arial" pitchFamily="34" charset="0"/>
+              <a:buChar char="•"/>
+            </a:pPr>
+            <a:r>
+              <a:rPr lang="de-CH" dirty="0" smtClean="0"/>
+              <a:t>Voci-Trainer</a:t>
             </a:r>
           </a:p>
           <a:p>
@@ -4370,10 +5000,872 @@
           </a:p>
         </p:txBody>
       </p:sp>
+      <p:pic>
+        <p:nvPicPr>
+          <p:cNvPr id="3074" name="Picture 2" descr="C:\Private\Jens\Programing\SchuelerOffice\SchuelerOffice\res\TrainerForm.png"/>
+          <p:cNvPicPr>
+            <a:picLocks noChangeAspect="1" noChangeArrowheads="1"/>
+          </p:cNvPicPr>
+          <p:nvPr/>
+        </p:nvPicPr>
+        <p:blipFill>
+          <a:blip r:embed="rId2">
+            <a:extLst>
+              <a:ext uri="{28A0092B-C50C-407E-A947-70E740481C1C}">
+                <a14:useLocalDpi xmlns:a14="http://schemas.microsoft.com/office/drawing/2010/main" val="0"/>
+              </a:ext>
+            </a:extLst>
+          </a:blip>
+          <a:srcRect/>
+          <a:stretch>
+            <a:fillRect/>
+          </a:stretch>
+        </p:blipFill>
+        <p:spPr bwMode="auto">
+          <a:xfrm>
+            <a:off x="5148064" y="908720"/>
+            <a:ext cx="3114675" cy="3543300"/>
+          </a:xfrm>
+          <a:prstGeom prst="rect">
+            <a:avLst/>
+          </a:prstGeom>
+          <a:noFill/>
+          <a:extLst>
+            <a:ext uri="{909E8E84-426E-40DD-AFC4-6F175D3DCCD1}">
+              <a14:hiddenFill xmlns:a14="http://schemas.microsoft.com/office/drawing/2010/main">
+                <a:solidFill>
+                  <a:srgbClr val="FFFFFF"/>
+                </a:solidFill>
+              </a14:hiddenFill>
+            </a:ext>
+          </a:extLst>
+        </p:spPr>
+      </p:pic>
+      <p:pic>
+        <p:nvPicPr>
+          <p:cNvPr id="3075" name="Picture 3" descr="C:\Private\Jens\Programing\SchuelerOffice\SchuelerOffice\res\GraphForm.png"/>
+          <p:cNvPicPr>
+            <a:picLocks noChangeAspect="1" noChangeArrowheads="1"/>
+          </p:cNvPicPr>
+          <p:nvPr/>
+        </p:nvPicPr>
+        <p:blipFill>
+          <a:blip r:embed="rId3">
+            <a:extLst>
+              <a:ext uri="{28A0092B-C50C-407E-A947-70E740481C1C}">
+                <a14:useLocalDpi xmlns:a14="http://schemas.microsoft.com/office/drawing/2010/main" val="0"/>
+              </a:ext>
+            </a:extLst>
+          </a:blip>
+          <a:srcRect/>
+          <a:stretch>
+            <a:fillRect/>
+          </a:stretch>
+        </p:blipFill>
+        <p:spPr bwMode="auto">
+          <a:xfrm>
+            <a:off x="395536" y="3053780"/>
+            <a:ext cx="4598894" cy="2708920"/>
+          </a:xfrm>
+          <a:prstGeom prst="rect">
+            <a:avLst/>
+          </a:prstGeom>
+          <a:noFill/>
+          <a:extLst>
+            <a:ext uri="{909E8E84-426E-40DD-AFC4-6F175D3DCCD1}">
+              <a14:hiddenFill xmlns:a14="http://schemas.microsoft.com/office/drawing/2010/main">
+                <a:solidFill>
+                  <a:srgbClr val="FFFFFF"/>
+                </a:solidFill>
+              </a14:hiddenFill>
+            </a:ext>
+          </a:extLst>
+        </p:spPr>
+      </p:pic>
+      <p:sp>
+        <p:nvSpPr>
+          <p:cNvPr id="4" name="TextBox 3"/>
+          <p:cNvSpPr txBox="1"/>
+          <p:nvPr/>
+        </p:nvSpPr>
+        <p:spPr>
+          <a:xfrm>
+            <a:off x="26690" y="0"/>
+            <a:ext cx="9117310" cy="16158270"/>
+          </a:xfrm>
+          <a:prstGeom prst="rect">
+            <a:avLst/>
+          </a:prstGeom>
+          <a:noFill/>
+        </p:spPr>
+        <p:txBody>
+          <a:bodyPr wrap="square" rtlCol="0">
+            <a:spAutoFit/>
+          </a:bodyPr>
+          <a:lstStyle/>
+          <a:p>
+            <a:r>
+              <a:rPr lang="de-CH" dirty="0"/>
+              <a:t> private void button_calcuteTargetMark_Click(object sender, EventArgs e)</a:t>
+            </a:r>
+          </a:p>
+          <a:p>
+            <a:r>
+              <a:rPr lang="de-CH" dirty="0"/>
+              <a:t>        {</a:t>
+            </a:r>
+          </a:p>
+          <a:p>
+            <a:r>
+              <a:rPr lang="de-CH" dirty="0"/>
+              <a:t>            if (textBox_targetMark.Text != "")</a:t>
+            </a:r>
+          </a:p>
+          <a:p>
+            <a:r>
+              <a:rPr lang="de-CH" dirty="0"/>
+              <a:t>            {</a:t>
+            </a:r>
+          </a:p>
+          <a:p>
+            <a:r>
+              <a:rPr lang="de-CH" dirty="0"/>
+              <a:t>                try</a:t>
+            </a:r>
+          </a:p>
+          <a:p>
+            <a:r>
+              <a:rPr lang="de-CH" dirty="0"/>
+              <a:t>                {</a:t>
+            </a:r>
+          </a:p>
+          <a:p>
+            <a:r>
+              <a:rPr lang="de-CH" dirty="0"/>
+              <a:t>                    float target = Convert.ToSingle(textBox_targetMark.Text);</a:t>
+            </a:r>
+          </a:p>
+          <a:p>
+            <a:r>
+              <a:rPr lang="en-US" dirty="0"/>
+              <a:t>                    if (target &gt; 6 || target &lt; 1)</a:t>
+            </a:r>
+          </a:p>
+          <a:p>
+            <a:r>
+              <a:rPr lang="de-CH" dirty="0"/>
+              <a:t>                    {</a:t>
+            </a:r>
+          </a:p>
+          <a:p>
+            <a:r>
+              <a:rPr lang="de-CH" dirty="0"/>
+              <a:t>                        Data.messageBox("Warnung!", "Ungültige eingabe!");</a:t>
+            </a:r>
+          </a:p>
+          <a:p>
+            <a:r>
+              <a:rPr lang="de-CH" dirty="0"/>
+              <a:t>                    }</a:t>
+            </a:r>
+          </a:p>
+          <a:p>
+            <a:r>
+              <a:rPr lang="de-CH" dirty="0"/>
+              <a:t>                    else</a:t>
+            </a:r>
+          </a:p>
+          <a:p>
+            <a:r>
+              <a:rPr lang="de-CH" dirty="0"/>
+              <a:t>                    {</a:t>
+            </a:r>
+          </a:p>
+          <a:p>
+            <a:r>
+              <a:rPr lang="de-CH" dirty="0"/>
+              <a:t>                        float total = 0;</a:t>
+            </a:r>
+          </a:p>
+          <a:p>
+            <a:r>
+              <a:rPr lang="de-CH" dirty="0"/>
+              <a:t>                        int i = 0;</a:t>
+            </a:r>
+          </a:p>
+          <a:p>
+            <a:r>
+              <a:rPr lang="de-CH" dirty="0"/>
+              <a:t>                        foreach (Mark m in Data.marks)</a:t>
+            </a:r>
+          </a:p>
+          <a:p>
+            <a:r>
+              <a:rPr lang="de-CH" dirty="0"/>
+              <a:t>                        {</a:t>
+            </a:r>
+          </a:p>
+          <a:p>
+            <a:r>
+              <a:rPr lang="de-CH" dirty="0"/>
+              <a:t>                            if (m._class == comboBox_classes.Text)</a:t>
+            </a:r>
+          </a:p>
+          <a:p>
+            <a:r>
+              <a:rPr lang="de-CH" dirty="0"/>
+              <a:t>                            {</a:t>
+            </a:r>
+          </a:p>
+          <a:p>
+            <a:r>
+              <a:rPr lang="de-CH" dirty="0"/>
+              <a:t>                                i++;</a:t>
+            </a:r>
+          </a:p>
+          <a:p>
+            <a:r>
+              <a:rPr lang="de-CH" dirty="0"/>
+              <a:t>                                total = total + m.mark;</a:t>
+            </a:r>
+          </a:p>
+          <a:p>
+            <a:r>
+              <a:rPr lang="de-CH" dirty="0"/>
+              <a:t>                            }</a:t>
+            </a:r>
+          </a:p>
+          <a:p>
+            <a:r>
+              <a:rPr lang="de-CH" dirty="0"/>
+              <a:t>                        }</a:t>
+            </a:r>
+          </a:p>
+          <a:p>
+            <a:r>
+              <a:rPr lang="de-CH" dirty="0"/>
+              <a:t>                        if (i != 0)</a:t>
+            </a:r>
+          </a:p>
+          <a:p>
+            <a:r>
+              <a:rPr lang="de-CH" dirty="0"/>
+              <a:t>                        {</a:t>
+            </a:r>
+          </a:p>
+          <a:p>
+            <a:r>
+              <a:rPr lang="en-US" dirty="0"/>
+              <a:t>                            float </a:t>
+            </a:r>
+            <a:r>
+              <a:rPr lang="en-US" dirty="0" err="1"/>
+              <a:t>targetMark</a:t>
+            </a:r>
+            <a:r>
+              <a:rPr lang="en-US" dirty="0"/>
+              <a:t> = target * </a:t>
+            </a:r>
+            <a:r>
+              <a:rPr lang="en-US" dirty="0" err="1"/>
+              <a:t>i</a:t>
+            </a:r>
+            <a:r>
+              <a:rPr lang="en-US" dirty="0"/>
+              <a:t> + target - total;</a:t>
+            </a:r>
+          </a:p>
+          <a:p>
+            <a:r>
+              <a:rPr lang="de-CH" dirty="0"/>
+              <a:t>                            float[] targetMarks = new float[20];</a:t>
+            </a:r>
+          </a:p>
+          <a:p>
+            <a:r>
+              <a:rPr lang="de-CH" dirty="0"/>
+              <a:t>                            int j = 0;</a:t>
+            </a:r>
+          </a:p>
+          <a:p>
+            <a:r>
+              <a:rPr lang="de-CH" dirty="0"/>
+              <a:t>                            while (targetMark &gt; 6)</a:t>
+            </a:r>
+          </a:p>
+          <a:p>
+            <a:r>
+              <a:rPr lang="de-CH" dirty="0"/>
+              <a:t>                            {</a:t>
+            </a:r>
+          </a:p>
+          <a:p>
+            <a:r>
+              <a:rPr lang="de-CH" dirty="0"/>
+              <a:t>                                total = total + 6;</a:t>
+            </a:r>
+          </a:p>
+          <a:p>
+            <a:r>
+              <a:rPr lang="de-CH" dirty="0"/>
+              <a:t>                                i++;</a:t>
+            </a:r>
+          </a:p>
+          <a:p>
+            <a:r>
+              <a:rPr lang="de-CH" dirty="0"/>
+              <a:t>                                targetMark = target * i + target - total;</a:t>
+            </a:r>
+          </a:p>
+          <a:p>
+            <a:r>
+              <a:rPr lang="de-CH" dirty="0"/>
+              <a:t>                                targetMarks[j] = 6;</a:t>
+            </a:r>
+          </a:p>
+          <a:p>
+            <a:r>
+              <a:rPr lang="de-CH" dirty="0"/>
+              <a:t>                                if (j == 19)</a:t>
+            </a:r>
+          </a:p>
+          <a:p>
+            <a:r>
+              <a:rPr lang="de-CH" dirty="0"/>
+              <a:t>                                {</a:t>
+            </a:r>
+          </a:p>
+          <a:p>
+            <a:r>
+              <a:rPr lang="de-CH" dirty="0"/>
+              <a:t>                                    break;</a:t>
+            </a:r>
+          </a:p>
+          <a:p>
+            <a:r>
+              <a:rPr lang="de-CH" dirty="0"/>
+              <a:t>                                }</a:t>
+            </a:r>
+          </a:p>
+          <a:p>
+            <a:r>
+              <a:rPr lang="de-CH" dirty="0"/>
+              <a:t>                                j++;</a:t>
+            </a:r>
+          </a:p>
+          <a:p>
+            <a:r>
+              <a:rPr lang="de-CH" dirty="0"/>
+              <a:t>                            }</a:t>
+            </a:r>
+          </a:p>
+          <a:p>
+            <a:r>
+              <a:rPr lang="de-CH" dirty="0"/>
+              <a:t>                            targetMarks[j] = targetMark;</a:t>
+            </a:r>
+          </a:p>
+          <a:p>
+            <a:r>
+              <a:rPr lang="de-CH" dirty="0"/>
+              <a:t>                            textBox_requiredMark.Text = "";</a:t>
+            </a:r>
+          </a:p>
+          <a:p>
+            <a:r>
+              <a:rPr lang="en-US" dirty="0"/>
+              <a:t>                            </a:t>
+            </a:r>
+            <a:r>
+              <a:rPr lang="en-US" dirty="0" err="1"/>
+              <a:t>foreach</a:t>
+            </a:r>
+            <a:r>
+              <a:rPr lang="en-US" dirty="0"/>
+              <a:t> (float f in </a:t>
+            </a:r>
+            <a:r>
+              <a:rPr lang="en-US" dirty="0" err="1"/>
+              <a:t>targetMarks</a:t>
+            </a:r>
+            <a:r>
+              <a:rPr lang="en-US" dirty="0"/>
+              <a:t>)</a:t>
+            </a:r>
+          </a:p>
+          <a:p>
+            <a:r>
+              <a:rPr lang="de-CH" dirty="0"/>
+              <a:t>                            {</a:t>
+            </a:r>
+          </a:p>
+          <a:p>
+            <a:r>
+              <a:rPr lang="de-CH" dirty="0"/>
+              <a:t>                                if (f != 0)</a:t>
+            </a:r>
+          </a:p>
+          <a:p>
+            <a:r>
+              <a:rPr lang="de-CH" dirty="0"/>
+              <a:t>                                {</a:t>
+            </a:r>
+          </a:p>
+          <a:p>
+            <a:r>
+              <a:rPr lang="de-CH" dirty="0"/>
+              <a:t>                                    textBox_requiredMark.Text = textBox_requiredMark.Text + Convert.ToString(f) + ",";</a:t>
+            </a:r>
+          </a:p>
+          <a:p>
+            <a:r>
+              <a:rPr lang="de-CH" dirty="0"/>
+              <a:t>                                }</a:t>
+            </a:r>
+          </a:p>
+          <a:p>
+            <a:r>
+              <a:rPr lang="de-CH" dirty="0"/>
+              <a:t>                            }</a:t>
+            </a:r>
+          </a:p>
+          <a:p>
+            <a:r>
+              <a:rPr lang="de-CH" dirty="0"/>
+              <a:t>                        }</a:t>
+            </a:r>
+          </a:p>
+          <a:p>
+            <a:r>
+              <a:rPr lang="de-CH" dirty="0"/>
+              <a:t>                    }</a:t>
+            </a:r>
+          </a:p>
+          <a:p>
+            <a:r>
+              <a:rPr lang="de-CH" dirty="0"/>
+              <a:t>                }</a:t>
+            </a:r>
+          </a:p>
+          <a:p>
+            <a:r>
+              <a:rPr lang="de-CH" dirty="0"/>
+              <a:t>                catch</a:t>
+            </a:r>
+          </a:p>
+          <a:p>
+            <a:r>
+              <a:rPr lang="de-CH" dirty="0"/>
+              <a:t>                {</a:t>
+            </a:r>
+          </a:p>
+          <a:p>
+            <a:r>
+              <a:rPr lang="de-CH" dirty="0"/>
+              <a:t>                    Data.messageBox("Warnung!", "Ungültige eingabe!");</a:t>
+            </a:r>
+          </a:p>
+          <a:p>
+            <a:r>
+              <a:rPr lang="de-CH" dirty="0"/>
+              <a:t>                }</a:t>
+            </a:r>
+          </a:p>
+          <a:p>
+            <a:r>
+              <a:rPr lang="de-CH" dirty="0"/>
+              <a:t>            }</a:t>
+            </a:r>
+          </a:p>
+        </p:txBody>
+      </p:sp>
     </p:spTree>
     <p:extLst>
       <p:ext uri="{BB962C8B-B14F-4D97-AF65-F5344CB8AC3E}">
         <p14:creationId xmlns:p14="http://schemas.microsoft.com/office/powerpoint/2010/main" val="700731515"/>
+      </p:ext>
+    </p:extLst>
+  </p:cSld>
+  <p:clrMapOvr>
+    <a:masterClrMapping/>
+  </p:clrMapOvr>
+  <p:timing>
+    <p:tnLst>
+      <p:par>
+        <p:cTn id="1" dur="indefinite" restart="never" nodeType="tmRoot">
+          <p:childTnLst>
+            <p:seq concurrent="1" nextAc="seek">
+              <p:cTn id="2" dur="indefinite" nodeType="mainSeq">
+                <p:childTnLst>
+                  <p:par>
+                    <p:cTn id="3" fill="hold">
+                      <p:stCondLst>
+                        <p:cond delay="indefinite"/>
+                      </p:stCondLst>
+                      <p:childTnLst>
+                        <p:par>
+                          <p:cTn id="4" fill="hold">
+                            <p:stCondLst>
+                              <p:cond delay="0"/>
+                            </p:stCondLst>
+                            <p:childTnLst>
+                              <p:par>
+                                <p:cTn id="5" presetID="10" presetClass="entr" presetSubtype="0" fill="hold" grpId="0" nodeType="clickEffect">
+                                  <p:stCondLst>
+                                    <p:cond delay="0"/>
+                                  </p:stCondLst>
+                                  <p:childTnLst>
+                                    <p:set>
+                                      <p:cBhvr>
+                                        <p:cTn id="6" dur="1" fill="hold">
+                                          <p:stCondLst>
+                                            <p:cond delay="0"/>
+                                          </p:stCondLst>
+                                        </p:cTn>
+                                        <p:tgtEl>
+                                          <p:spTgt spid="4"/>
+                                        </p:tgtEl>
+                                        <p:attrNameLst>
+                                          <p:attrName>style.visibility</p:attrName>
+                                        </p:attrNameLst>
+                                      </p:cBhvr>
+                                      <p:to>
+                                        <p:strVal val="visible"/>
+                                      </p:to>
+                                    </p:set>
+                                    <p:animEffect transition="in" filter="fade">
+                                      <p:cBhvr>
+                                        <p:cTn id="7" dur="500"/>
+                                        <p:tgtEl>
+                                          <p:spTgt spid="4"/>
+                                        </p:tgtEl>
+                                      </p:cBhvr>
+                                    </p:animEffect>
+                                  </p:childTnLst>
+                                </p:cTn>
+                              </p:par>
+                            </p:childTnLst>
+                          </p:cTn>
+                        </p:par>
+                      </p:childTnLst>
+                    </p:cTn>
+                  </p:par>
+                  <p:par>
+                    <p:cTn id="8" fill="hold">
+                      <p:stCondLst>
+                        <p:cond delay="indefinite"/>
+                      </p:stCondLst>
+                      <p:childTnLst>
+                        <p:par>
+                          <p:cTn id="9" fill="hold">
+                            <p:stCondLst>
+                              <p:cond delay="0"/>
+                            </p:stCondLst>
+                            <p:childTnLst>
+                              <p:par>
+                                <p:cTn id="10" presetID="42" presetClass="path" presetSubtype="0" accel="50000" decel="50000" fill="hold" grpId="1" nodeType="clickEffect">
+                                  <p:stCondLst>
+                                    <p:cond delay="0"/>
+                                  </p:stCondLst>
+                                  <p:childTnLst>
+                                    <p:animMotion origin="layout" path="M 1.11111E-6 7.40741E-7 L -0.00139 -1.45509 " pathEditMode="relative" rAng="0" ptsTypes="AA">
+                                      <p:cBhvr>
+                                        <p:cTn id="11" dur="5000" fill="hold"/>
+                                        <p:tgtEl>
+                                          <p:spTgt spid="4"/>
+                                        </p:tgtEl>
+                                        <p:attrNameLst>
+                                          <p:attrName>ppt_x</p:attrName>
+                                          <p:attrName>ppt_y</p:attrName>
+                                        </p:attrNameLst>
+                                      </p:cBhvr>
+                                      <p:rCtr x="-69" y="-72755"/>
+                                    </p:animMotion>
+                                  </p:childTnLst>
+                                </p:cTn>
+                              </p:par>
+                            </p:childTnLst>
+                          </p:cTn>
+                        </p:par>
+                      </p:childTnLst>
+                    </p:cTn>
+                  </p:par>
+                  <p:par>
+                    <p:cTn id="12" fill="hold">
+                      <p:stCondLst>
+                        <p:cond delay="indefinite"/>
+                      </p:stCondLst>
+                      <p:childTnLst>
+                        <p:par>
+                          <p:cTn id="13" fill="hold">
+                            <p:stCondLst>
+                              <p:cond delay="0"/>
+                            </p:stCondLst>
+                            <p:childTnLst>
+                              <p:par>
+                                <p:cTn id="14" presetID="10" presetClass="exit" presetSubtype="0" fill="hold" grpId="2" nodeType="clickEffect">
+                                  <p:stCondLst>
+                                    <p:cond delay="0"/>
+                                  </p:stCondLst>
+                                  <p:childTnLst>
+                                    <p:animEffect transition="out" filter="fade">
+                                      <p:cBhvr>
+                                        <p:cTn id="15" dur="500"/>
+                                        <p:tgtEl>
+                                          <p:spTgt spid="4"/>
+                                        </p:tgtEl>
+                                      </p:cBhvr>
+                                    </p:animEffect>
+                                    <p:set>
+                                      <p:cBhvr>
+                                        <p:cTn id="16" dur="1" fill="hold">
+                                          <p:stCondLst>
+                                            <p:cond delay="499"/>
+                                          </p:stCondLst>
+                                        </p:cTn>
+                                        <p:tgtEl>
+                                          <p:spTgt spid="4"/>
+                                        </p:tgtEl>
+                                        <p:attrNameLst>
+                                          <p:attrName>style.visibility</p:attrName>
+                                        </p:attrNameLst>
+                                      </p:cBhvr>
+                                      <p:to>
+                                        <p:strVal val="hidden"/>
+                                      </p:to>
+                                    </p:set>
+                                  </p:childTnLst>
+                                </p:cTn>
+                              </p:par>
+                            </p:childTnLst>
+                          </p:cTn>
+                        </p:par>
+                      </p:childTnLst>
+                    </p:cTn>
+                  </p:par>
+                </p:childTnLst>
+              </p:cTn>
+              <p:prevCondLst>
+                <p:cond evt="onPrev" delay="0">
+                  <p:tgtEl>
+                    <p:sldTgt/>
+                  </p:tgtEl>
+                </p:cond>
+              </p:prevCondLst>
+              <p:nextCondLst>
+                <p:cond evt="onNext" delay="0">
+                  <p:tgtEl>
+                    <p:sldTgt/>
+                  </p:tgtEl>
+                </p:cond>
+              </p:nextCondLst>
+            </p:seq>
+          </p:childTnLst>
+        </p:cTn>
+      </p:par>
+    </p:tnLst>
+    <p:bldLst>
+      <p:bldP spid="4" grpId="0"/>
+      <p:bldP spid="4" grpId="1"/>
+      <p:bldP spid="4" grpId="2"/>
+    </p:bldLst>
+  </p:timing>
+</p:sld>
+</file>
+
+<file path=ppt/slides/slide5.xml><?xml version="1.0" encoding="utf-8"?>
+<p:sld xmlns:a="http://schemas.openxmlformats.org/drawingml/2006/main" xmlns:r="http://schemas.openxmlformats.org/officeDocument/2006/relationships" xmlns:p="http://schemas.openxmlformats.org/presentationml/2006/main">
+  <p:cSld>
+    <p:spTree>
+      <p:nvGrpSpPr>
+        <p:cNvPr id="1" name=""/>
+        <p:cNvGrpSpPr/>
+        <p:nvPr/>
+      </p:nvGrpSpPr>
+      <p:grpSpPr>
+        <a:xfrm>
+          <a:off x="0" y="0"/>
+          <a:ext cx="0" cy="0"/>
+          <a:chOff x="0" y="0"/>
+          <a:chExt cx="0" cy="0"/>
+        </a:xfrm>
+      </p:grpSpPr>
+      <p:sp>
+        <p:nvSpPr>
+          <p:cNvPr id="2" name="Content Placeholder 1"/>
+          <p:cNvSpPr>
+            <a:spLocks noGrp="1"/>
+          </p:cNvSpPr>
+          <p:nvPr>
+            <p:ph sz="quarter" idx="13"/>
+          </p:nvPr>
+        </p:nvSpPr>
+        <p:spPr/>
+        <p:txBody>
+          <a:bodyPr/>
+          <a:lstStyle/>
+          <a:p>
+            <a:endParaRPr lang="de-CH"/>
+          </a:p>
+        </p:txBody>
+      </p:sp>
+      <p:sp>
+        <p:nvSpPr>
+          <p:cNvPr id="3" name="Title 2"/>
+          <p:cNvSpPr>
+            <a:spLocks noGrp="1"/>
+          </p:cNvSpPr>
+          <p:nvPr>
+            <p:ph type="title"/>
+          </p:nvPr>
+        </p:nvSpPr>
+        <p:spPr/>
+        <p:txBody>
+          <a:bodyPr/>
+          <a:lstStyle/>
+          <a:p>
+            <a:r>
+              <a:rPr lang="de-CH" dirty="0" smtClean="0"/>
+              <a:t>Visualisierung</a:t>
+            </a:r>
+            <a:endParaRPr lang="de-CH" dirty="0"/>
+          </a:p>
+        </p:txBody>
+      </p:sp>
+    </p:spTree>
+    <p:extLst>
+      <p:ext uri="{BB962C8B-B14F-4D97-AF65-F5344CB8AC3E}">
+        <p14:creationId xmlns:p14="http://schemas.microsoft.com/office/powerpoint/2010/main" val="2308028193"/>
+      </p:ext>
+    </p:extLst>
+  </p:cSld>
+  <p:clrMapOvr>
+    <a:masterClrMapping/>
+  </p:clrMapOvr>
+  <p:timing>
+    <p:tnLst>
+      <p:par>
+        <p:cTn id="1" dur="indefinite" restart="never" nodeType="tmRoot"/>
+      </p:par>
+    </p:tnLst>
+  </p:timing>
+</p:sld>
+</file>
+
+<file path=ppt/slides/slide6.xml><?xml version="1.0" encoding="utf-8"?>
+<p:sld xmlns:a="http://schemas.openxmlformats.org/drawingml/2006/main" xmlns:r="http://schemas.openxmlformats.org/officeDocument/2006/relationships" xmlns:p="http://schemas.openxmlformats.org/presentationml/2006/main">
+  <p:cSld>
+    <p:spTree>
+      <p:nvGrpSpPr>
+        <p:cNvPr id="1" name=""/>
+        <p:cNvGrpSpPr/>
+        <p:nvPr/>
+      </p:nvGrpSpPr>
+      <p:grpSpPr>
+        <a:xfrm>
+          <a:off x="0" y="0"/>
+          <a:ext cx="0" cy="0"/>
+          <a:chOff x="0" y="0"/>
+          <a:chExt cx="0" cy="0"/>
+        </a:xfrm>
+      </p:grpSpPr>
+      <p:sp>
+        <p:nvSpPr>
+          <p:cNvPr id="2" name="Content Placeholder 1"/>
+          <p:cNvSpPr>
+            <a:spLocks noGrp="1"/>
+          </p:cNvSpPr>
+          <p:nvPr>
+            <p:ph sz="quarter" idx="13"/>
+          </p:nvPr>
+        </p:nvSpPr>
+        <p:spPr/>
+        <p:txBody>
+          <a:bodyPr/>
+          <a:lstStyle/>
+          <a:p>
+            <a:r>
+              <a:rPr lang="de-CH" dirty="0" smtClean="0"/>
+              <a:t>Download: </a:t>
+            </a:r>
+            <a:r>
+              <a:rPr lang="de-CH" dirty="0" smtClean="0">
+                <a:hlinkClick r:id="rId2"/>
+              </a:rPr>
+              <a:t>http://so.northcode.no/</a:t>
+            </a:r>
+            <a:endParaRPr lang="de-CH" dirty="0" smtClean="0"/>
+          </a:p>
+          <a:p>
+            <a:r>
+              <a:rPr lang="de-CH" dirty="0"/>
+              <a:t>Source: </a:t>
+            </a:r>
+            <a:r>
+              <a:rPr lang="de-CH" dirty="0">
+                <a:hlinkClick r:id="rId3"/>
+              </a:rPr>
+              <a:t>https://</a:t>
+            </a:r>
+            <a:r>
+              <a:rPr lang="de-CH" dirty="0" smtClean="0">
+                <a:hlinkClick r:id="rId3"/>
+              </a:rPr>
+              <a:t>github.com/Jenjen1324/SchuelerOffice</a:t>
+            </a:r>
+            <a:endParaRPr lang="de-CH" dirty="0" smtClean="0"/>
+          </a:p>
+          <a:p>
+            <a:r>
+              <a:rPr lang="de-CH" dirty="0"/>
+              <a:t>Wiki: </a:t>
+            </a:r>
+            <a:r>
+              <a:rPr lang="de-CH" dirty="0">
+                <a:hlinkClick r:id="rId4"/>
+              </a:rPr>
+              <a:t>https://</a:t>
+            </a:r>
+            <a:r>
+              <a:rPr lang="de-CH" dirty="0" smtClean="0">
+                <a:hlinkClick r:id="rId4"/>
+              </a:rPr>
+              <a:t>github.com/Jenjen1324/SchuelerOffice/wiki</a:t>
+            </a:r>
+            <a:endParaRPr lang="de-CH" dirty="0" smtClean="0"/>
+          </a:p>
+          <a:p>
+            <a:endParaRPr lang="de-CH" dirty="0"/>
+          </a:p>
+        </p:txBody>
+      </p:sp>
+      <p:sp>
+        <p:nvSpPr>
+          <p:cNvPr id="3" name="Title 2"/>
+          <p:cNvSpPr>
+            <a:spLocks noGrp="1"/>
+          </p:cNvSpPr>
+          <p:nvPr>
+            <p:ph type="title"/>
+          </p:nvPr>
+        </p:nvSpPr>
+        <p:spPr/>
+        <p:txBody>
+          <a:bodyPr/>
+          <a:lstStyle/>
+          <a:p>
+            <a:r>
+              <a:rPr lang="de-CH" dirty="0" smtClean="0"/>
+              <a:t>Danke fürs zuhören</a:t>
+            </a:r>
+            <a:endParaRPr lang="de-CH" dirty="0"/>
+          </a:p>
+        </p:txBody>
+      </p:sp>
+    </p:spTree>
+    <p:extLst>
+      <p:ext uri="{BB962C8B-B14F-4D97-AF65-F5344CB8AC3E}">
+        <p14:creationId xmlns:p14="http://schemas.microsoft.com/office/powerpoint/2010/main" val="1708913882"/>
       </p:ext>
     </p:extLst>
   </p:cSld>

</xml_diff>

<commit_message>
An der präsentation gerabeitet
</commit_message>
<xml_diff>
--- a/Projektarbeit.pptx
+++ b/Projektarbeit.pptx
@@ -9,6 +9,8 @@
     <p:sldId id="257" r:id="rId3"/>
     <p:sldId id="258" r:id="rId4"/>
     <p:sldId id="259" r:id="rId5"/>
+    <p:sldId id="260" r:id="rId6"/>
+    <p:sldId id="261" r:id="rId7"/>
   </p:sldIdLst>
   <p:sldSz cx="9144000" cy="6858000" type="screen4x3"/>
   <p:notesSz cx="6858000" cy="9144000"/>
@@ -346,7 +348,7 @@
           <a:p>
             <a:fld id="{33548BFF-153A-4E7C-BBF9-39DDD51A52AC}" type="datetimeFigureOut">
               <a:rPr lang="de-CH" smtClean="0"/>
-              <a:t>16.06.2013</a:t>
+              <a:t>17.06.2013</a:t>
             </a:fld>
             <a:endParaRPr lang="de-CH"/>
           </a:p>
@@ -624,7 +626,7 @@
           <a:p>
             <a:fld id="{33548BFF-153A-4E7C-BBF9-39DDD51A52AC}" type="datetimeFigureOut">
               <a:rPr lang="de-CH" smtClean="0"/>
-              <a:t>16.06.2013</a:t>
+              <a:t>17.06.2013</a:t>
             </a:fld>
             <a:endParaRPr lang="de-CH"/>
           </a:p>
@@ -847,7 +849,7 @@
           <a:p>
             <a:fld id="{33548BFF-153A-4E7C-BBF9-39DDD51A52AC}" type="datetimeFigureOut">
               <a:rPr lang="de-CH" smtClean="0"/>
-              <a:t>16.06.2013</a:t>
+              <a:t>17.06.2013</a:t>
             </a:fld>
             <a:endParaRPr lang="de-CH"/>
           </a:p>
@@ -1042,7 +1044,7 @@
           <a:p>
             <a:fld id="{33548BFF-153A-4E7C-BBF9-39DDD51A52AC}" type="datetimeFigureOut">
               <a:rPr lang="de-CH" smtClean="0"/>
-              <a:t>16.06.2013</a:t>
+              <a:t>17.06.2013</a:t>
             </a:fld>
             <a:endParaRPr lang="de-CH"/>
           </a:p>
@@ -1322,7 +1324,7 @@
           <a:p>
             <a:fld id="{33548BFF-153A-4E7C-BBF9-39DDD51A52AC}" type="datetimeFigureOut">
               <a:rPr lang="de-CH" smtClean="0"/>
-              <a:t>16.06.2013</a:t>
+              <a:t>17.06.2013</a:t>
             </a:fld>
             <a:endParaRPr lang="de-CH"/>
           </a:p>
@@ -1795,7 +1797,7 @@
           <a:p>
             <a:fld id="{33548BFF-153A-4E7C-BBF9-39DDD51A52AC}" type="datetimeFigureOut">
               <a:rPr lang="de-CH" smtClean="0"/>
-              <a:t>16.06.2013</a:t>
+              <a:t>17.06.2013</a:t>
             </a:fld>
             <a:endParaRPr lang="de-CH"/>
           </a:p>
@@ -2250,7 +2252,7 @@
           <a:p>
             <a:fld id="{33548BFF-153A-4E7C-BBF9-39DDD51A52AC}" type="datetimeFigureOut">
               <a:rPr lang="de-CH" smtClean="0"/>
-              <a:t>16.06.2013</a:t>
+              <a:t>17.06.2013</a:t>
             </a:fld>
             <a:endParaRPr lang="de-CH"/>
           </a:p>
@@ -2388,7 +2390,7 @@
           <a:p>
             <a:fld id="{33548BFF-153A-4E7C-BBF9-39DDD51A52AC}" type="datetimeFigureOut">
               <a:rPr lang="de-CH" smtClean="0"/>
-              <a:t>16.06.2013</a:t>
+              <a:t>17.06.2013</a:t>
             </a:fld>
             <a:endParaRPr lang="de-CH"/>
           </a:p>
@@ -2549,7 +2551,7 @@
           <a:p>
             <a:fld id="{33548BFF-153A-4E7C-BBF9-39DDD51A52AC}" type="datetimeFigureOut">
               <a:rPr lang="de-CH" smtClean="0"/>
-              <a:t>16.06.2013</a:t>
+              <a:t>17.06.2013</a:t>
             </a:fld>
             <a:endParaRPr lang="de-CH"/>
           </a:p>
@@ -2943,7 +2945,7 @@
           <a:p>
             <a:fld id="{33548BFF-153A-4E7C-BBF9-39DDD51A52AC}" type="datetimeFigureOut">
               <a:rPr lang="de-CH" smtClean="0"/>
-              <a:t>16.06.2013</a:t>
+              <a:t>17.06.2013</a:t>
             </a:fld>
             <a:endParaRPr lang="de-CH"/>
           </a:p>
@@ -3343,7 +3345,7 @@
           <a:p>
             <a:fld id="{33548BFF-153A-4E7C-BBF9-39DDD51A52AC}" type="datetimeFigureOut">
               <a:rPr lang="de-CH" smtClean="0"/>
-              <a:t>16.06.2013</a:t>
+              <a:t>17.06.2013</a:t>
             </a:fld>
             <a:endParaRPr lang="de-CH"/>
           </a:p>
@@ -3553,7 +3555,7 @@
           <a:p>
             <a:fld id="{33548BFF-153A-4E7C-BBF9-39DDD51A52AC}" type="datetimeFigureOut">
               <a:rPr lang="de-CH" smtClean="0"/>
-              <a:t>16.06.2013</a:t>
+              <a:t>17.06.2013</a:t>
             </a:fld>
             <a:endParaRPr lang="de-CH"/>
           </a:p>
@@ -4013,6 +4015,13 @@
   <p:clrMapOvr>
     <a:masterClrMapping/>
   </p:clrMapOvr>
+  <p:timing>
+    <p:tnLst>
+      <p:par>
+        <p:cTn id="1" dur="indefinite" restart="never" nodeType="tmRoot"/>
+      </p:par>
+    </p:tnLst>
+  </p:timing>
 </p:sld>
 </file>
 
@@ -4107,6 +4116,170 @@
           </a:p>
         </p:txBody>
       </p:sp>
+      <p:pic>
+        <p:nvPicPr>
+          <p:cNvPr id="1027" name="Picture 3" descr="C:\Private\Jens\Programing\SchuelerOffice\SchuelerOffice\res\Chopper.png"/>
+          <p:cNvPicPr>
+            <a:picLocks noChangeAspect="1" noChangeArrowheads="1"/>
+          </p:cNvPicPr>
+          <p:nvPr/>
+        </p:nvPicPr>
+        <p:blipFill>
+          <a:blip r:embed="rId2" cstate="print">
+            <a:extLst>
+              <a:ext uri="{28A0092B-C50C-407E-A947-70E740481C1C}">
+                <a14:useLocalDpi xmlns:a14="http://schemas.microsoft.com/office/drawing/2010/main" val="0"/>
+              </a:ext>
+            </a:extLst>
+          </a:blip>
+          <a:srcRect/>
+          <a:stretch>
+            <a:fillRect/>
+          </a:stretch>
+        </p:blipFill>
+        <p:spPr bwMode="auto">
+          <a:xfrm>
+            <a:off x="6444208" y="332656"/>
+            <a:ext cx="2473180" cy="1648939"/>
+          </a:xfrm>
+          <a:prstGeom prst="rect">
+            <a:avLst/>
+          </a:prstGeom>
+          <a:noFill/>
+          <a:extLst>
+            <a:ext uri="{909E8E84-426E-40DD-AFC4-6F175D3DCCD1}">
+              <a14:hiddenFill xmlns:a14="http://schemas.microsoft.com/office/drawing/2010/main">
+                <a:solidFill>
+                  <a:srgbClr val="FFFFFF"/>
+                </a:solidFill>
+              </a14:hiddenFill>
+            </a:ext>
+          </a:extLst>
+        </p:spPr>
+      </p:pic>
+      <p:pic>
+        <p:nvPicPr>
+          <p:cNvPr id="1028" name="Picture 4" descr="C:\Private\Jens\Programing\SchuelerOffice\SchuelerOffice\res\Quadcopter.png"/>
+          <p:cNvPicPr>
+            <a:picLocks noChangeAspect="1" noChangeArrowheads="1"/>
+          </p:cNvPicPr>
+          <p:nvPr/>
+        </p:nvPicPr>
+        <p:blipFill>
+          <a:blip r:embed="rId3">
+            <a:extLst>
+              <a:ext uri="{28A0092B-C50C-407E-A947-70E740481C1C}">
+                <a14:useLocalDpi xmlns:a14="http://schemas.microsoft.com/office/drawing/2010/main" val="0"/>
+              </a:ext>
+            </a:extLst>
+          </a:blip>
+          <a:srcRect/>
+          <a:stretch>
+            <a:fillRect/>
+          </a:stretch>
+        </p:blipFill>
+        <p:spPr bwMode="auto">
+          <a:xfrm>
+            <a:off x="6782684" y="4005064"/>
+            <a:ext cx="2134704" cy="1376884"/>
+          </a:xfrm>
+          <a:prstGeom prst="rect">
+            <a:avLst/>
+          </a:prstGeom>
+          <a:noFill/>
+          <a:extLst>
+            <a:ext uri="{909E8E84-426E-40DD-AFC4-6F175D3DCCD1}">
+              <a14:hiddenFill xmlns:a14="http://schemas.microsoft.com/office/drawing/2010/main">
+                <a:solidFill>
+                  <a:srgbClr val="FFFFFF"/>
+                </a:solidFill>
+              </a14:hiddenFill>
+            </a:ext>
+          </a:extLst>
+        </p:spPr>
+      </p:pic>
+      <p:pic>
+        <p:nvPicPr>
+          <p:cNvPr id="1029" name="Picture 5" descr="C:\Private\Jens\Programing\SchuelerOffice\SchuelerOffice\res\Robot.png"/>
+          <p:cNvPicPr>
+            <a:picLocks noChangeAspect="1" noChangeArrowheads="1"/>
+          </p:cNvPicPr>
+          <p:nvPr/>
+        </p:nvPicPr>
+        <p:blipFill>
+          <a:blip r:embed="rId4" cstate="print">
+            <a:extLst>
+              <a:ext uri="{28A0092B-C50C-407E-A947-70E740481C1C}">
+                <a14:useLocalDpi xmlns:a14="http://schemas.microsoft.com/office/drawing/2010/main" val="0"/>
+              </a:ext>
+            </a:extLst>
+          </a:blip>
+          <a:srcRect/>
+          <a:stretch>
+            <a:fillRect/>
+          </a:stretch>
+        </p:blipFill>
+        <p:spPr bwMode="auto">
+          <a:xfrm>
+            <a:off x="3491880" y="99289"/>
+            <a:ext cx="3154379" cy="3277005"/>
+          </a:xfrm>
+          <a:prstGeom prst="rect">
+            <a:avLst/>
+          </a:prstGeom>
+          <a:noFill/>
+          <a:extLst>
+            <a:ext uri="{909E8E84-426E-40DD-AFC4-6F175D3DCCD1}">
+              <a14:hiddenFill xmlns:a14="http://schemas.microsoft.com/office/drawing/2010/main">
+                <a:solidFill>
+                  <a:srgbClr val="FFFFFF"/>
+                </a:solidFill>
+              </a14:hiddenFill>
+            </a:ext>
+          </a:extLst>
+        </p:spPr>
+      </p:pic>
+      <p:pic>
+        <p:nvPicPr>
+          <p:cNvPr id="1030" name="Picture 6" descr="C:\Private\Jens\Programing\SchuelerOffice\SchuelerOffice\res\20130617_144507.jpg"/>
+          <p:cNvPicPr>
+            <a:picLocks noChangeAspect="1" noChangeArrowheads="1"/>
+          </p:cNvPicPr>
+          <p:nvPr/>
+        </p:nvPicPr>
+        <p:blipFill>
+          <a:blip r:embed="rId5" cstate="print">
+            <a:extLst>
+              <a:ext uri="{28A0092B-C50C-407E-A947-70E740481C1C}">
+                <a14:useLocalDpi xmlns:a14="http://schemas.microsoft.com/office/drawing/2010/main" val="0"/>
+              </a:ext>
+            </a:extLst>
+          </a:blip>
+          <a:srcRect/>
+          <a:stretch>
+            <a:fillRect/>
+          </a:stretch>
+        </p:blipFill>
+        <p:spPr bwMode="auto">
+          <a:xfrm>
+            <a:off x="179512" y="3356992"/>
+            <a:ext cx="4104456" cy="3078342"/>
+          </a:xfrm>
+          <a:prstGeom prst="rect">
+            <a:avLst/>
+          </a:prstGeom>
+          <a:noFill/>
+          <a:extLst>
+            <a:ext uri="{909E8E84-426E-40DD-AFC4-6F175D3DCCD1}">
+              <a14:hiddenFill xmlns:a14="http://schemas.microsoft.com/office/drawing/2010/main">
+                <a:solidFill>
+                  <a:srgbClr val="FFFFFF"/>
+                </a:solidFill>
+              </a14:hiddenFill>
+            </a:ext>
+          </a:extLst>
+        </p:spPr>
+      </p:pic>
     </p:spTree>
     <p:extLst>
       <p:ext uri="{BB962C8B-B14F-4D97-AF65-F5344CB8AC3E}">
@@ -4117,6 +4290,13 @@
   <p:clrMapOvr>
     <a:masterClrMapping/>
   </p:clrMapOvr>
+  <p:timing>
+    <p:tnLst>
+      <p:par>
+        <p:cTn id="1" dur="indefinite" restart="never" nodeType="tmRoot"/>
+      </p:par>
+    </p:tnLst>
+  </p:timing>
 </p:sld>
 </file>
 
@@ -4277,6 +4457,88 @@
           </a:p>
         </p:txBody>
       </p:sp>
+      <p:pic>
+        <p:nvPicPr>
+          <p:cNvPr id="2050" name="Picture 2" descr="C:\Private\Jens\Programing\SchuelerOffice\SchuelerOffice\res\DafuqForm.png"/>
+          <p:cNvPicPr>
+            <a:picLocks noChangeAspect="1" noChangeArrowheads="1"/>
+          </p:cNvPicPr>
+          <p:nvPr/>
+        </p:nvPicPr>
+        <p:blipFill>
+          <a:blip r:embed="rId2">
+            <a:extLst>
+              <a:ext uri="{28A0092B-C50C-407E-A947-70E740481C1C}">
+                <a14:useLocalDpi xmlns:a14="http://schemas.microsoft.com/office/drawing/2010/main" val="0"/>
+              </a:ext>
+            </a:extLst>
+          </a:blip>
+          <a:srcRect/>
+          <a:stretch>
+            <a:fillRect/>
+          </a:stretch>
+        </p:blipFill>
+        <p:spPr bwMode="auto">
+          <a:xfrm>
+            <a:off x="3416052" y="1556792"/>
+            <a:ext cx="4025432" cy="3380581"/>
+          </a:xfrm>
+          <a:prstGeom prst="rect">
+            <a:avLst/>
+          </a:prstGeom>
+          <a:noFill/>
+          <a:extLst>
+            <a:ext uri="{909E8E84-426E-40DD-AFC4-6F175D3DCCD1}">
+              <a14:hiddenFill xmlns:a14="http://schemas.microsoft.com/office/drawing/2010/main">
+                <a:solidFill>
+                  <a:srgbClr val="FFFFFF"/>
+                </a:solidFill>
+              </a14:hiddenFill>
+            </a:ext>
+          </a:extLst>
+        </p:spPr>
+      </p:pic>
+      <p:pic>
+        <p:nvPicPr>
+          <p:cNvPr id="2051" name="Picture 3" descr="C:\Private\Jens\Programing\SchuelerOffice\SchuelerOffice\res\GoodForm.png"/>
+          <p:cNvPicPr>
+            <a:picLocks noChangeAspect="1" noChangeArrowheads="1"/>
+          </p:cNvPicPr>
+          <p:nvPr/>
+        </p:nvPicPr>
+        <p:blipFill>
+          <a:blip r:embed="rId3">
+            <a:extLst>
+              <a:ext uri="{28A0092B-C50C-407E-A947-70E740481C1C}">
+                <a14:useLocalDpi xmlns:a14="http://schemas.microsoft.com/office/drawing/2010/main" val="0"/>
+              </a:ext>
+            </a:extLst>
+          </a:blip>
+          <a:srcRect/>
+          <a:stretch>
+            <a:fillRect/>
+          </a:stretch>
+        </p:blipFill>
+        <p:spPr bwMode="auto">
+          <a:xfrm>
+            <a:off x="683568" y="1700808"/>
+            <a:ext cx="7754938" cy="4562475"/>
+          </a:xfrm>
+          <a:prstGeom prst="rect">
+            <a:avLst/>
+          </a:prstGeom>
+          <a:noFill/>
+          <a:extLst>
+            <a:ext uri="{909E8E84-426E-40DD-AFC4-6F175D3DCCD1}">
+              <a14:hiddenFill xmlns:a14="http://schemas.microsoft.com/office/drawing/2010/main">
+                <a:solidFill>
+                  <a:srgbClr val="FFFFFF"/>
+                </a:solidFill>
+              </a14:hiddenFill>
+            </a:ext>
+          </a:extLst>
+        </p:spPr>
+      </p:pic>
     </p:spTree>
     <p:extLst>
       <p:ext uri="{BB962C8B-B14F-4D97-AF65-F5344CB8AC3E}">
@@ -4290,7 +4552,355 @@
   <p:timing>
     <p:tnLst>
       <p:par>
-        <p:cTn id="1" dur="indefinite" restart="never" nodeType="tmRoot"/>
+        <p:cTn id="1" dur="indefinite" restart="never" nodeType="tmRoot">
+          <p:childTnLst>
+            <p:seq concurrent="1" nextAc="seek">
+              <p:cTn id="2" dur="indefinite" nodeType="mainSeq">
+                <p:childTnLst>
+                  <p:par>
+                    <p:cTn id="3" fill="hold">
+                      <p:stCondLst>
+                        <p:cond delay="indefinite"/>
+                      </p:stCondLst>
+                      <p:childTnLst>
+                        <p:par>
+                          <p:cTn id="4" fill="hold">
+                            <p:stCondLst>
+                              <p:cond delay="0"/>
+                            </p:stCondLst>
+                            <p:childTnLst>
+                              <p:par>
+                                <p:cTn id="5" presetID="2" presetClass="entr" presetSubtype="8" fill="hold" nodeType="clickEffect">
+                                  <p:stCondLst>
+                                    <p:cond delay="0"/>
+                                  </p:stCondLst>
+                                  <p:childTnLst>
+                                    <p:set>
+                                      <p:cBhvr>
+                                        <p:cTn id="6" dur="1" fill="hold">
+                                          <p:stCondLst>
+                                            <p:cond delay="0"/>
+                                          </p:stCondLst>
+                                        </p:cTn>
+                                        <p:tgtEl>
+                                          <p:spTgt spid="2050"/>
+                                        </p:tgtEl>
+                                        <p:attrNameLst>
+                                          <p:attrName>style.visibility</p:attrName>
+                                        </p:attrNameLst>
+                                      </p:cBhvr>
+                                      <p:to>
+                                        <p:strVal val="visible"/>
+                                      </p:to>
+                                    </p:set>
+                                    <p:anim calcmode="lin" valueType="num">
+                                      <p:cBhvr additive="base">
+                                        <p:cTn id="7" dur="500" fill="hold"/>
+                                        <p:tgtEl>
+                                          <p:spTgt spid="2050"/>
+                                        </p:tgtEl>
+                                        <p:attrNameLst>
+                                          <p:attrName>ppt_x</p:attrName>
+                                        </p:attrNameLst>
+                                      </p:cBhvr>
+                                      <p:tavLst>
+                                        <p:tav tm="0">
+                                          <p:val>
+                                            <p:strVal val="0-#ppt_w/2"/>
+                                          </p:val>
+                                        </p:tav>
+                                        <p:tav tm="100000">
+                                          <p:val>
+                                            <p:strVal val="#ppt_x"/>
+                                          </p:val>
+                                        </p:tav>
+                                      </p:tavLst>
+                                    </p:anim>
+                                    <p:anim calcmode="lin" valueType="num">
+                                      <p:cBhvr additive="base">
+                                        <p:cTn id="8" dur="500" fill="hold"/>
+                                        <p:tgtEl>
+                                          <p:spTgt spid="2050"/>
+                                        </p:tgtEl>
+                                        <p:attrNameLst>
+                                          <p:attrName>ppt_y</p:attrName>
+                                        </p:attrNameLst>
+                                      </p:cBhvr>
+                                      <p:tavLst>
+                                        <p:tav tm="0">
+                                          <p:val>
+                                            <p:strVal val="#ppt_y"/>
+                                          </p:val>
+                                        </p:tav>
+                                        <p:tav tm="100000">
+                                          <p:val>
+                                            <p:strVal val="#ppt_y"/>
+                                          </p:val>
+                                        </p:tav>
+                                      </p:tavLst>
+                                    </p:anim>
+                                  </p:childTnLst>
+                                </p:cTn>
+                              </p:par>
+                            </p:childTnLst>
+                          </p:cTn>
+                        </p:par>
+                      </p:childTnLst>
+                    </p:cTn>
+                  </p:par>
+                  <p:par>
+                    <p:cTn id="9" fill="hold">
+                      <p:stCondLst>
+                        <p:cond delay="indefinite"/>
+                      </p:stCondLst>
+                      <p:childTnLst>
+                        <p:par>
+                          <p:cTn id="10" fill="hold">
+                            <p:stCondLst>
+                              <p:cond delay="0"/>
+                            </p:stCondLst>
+                            <p:childTnLst>
+                              <p:par>
+                                <p:cTn id="11" presetID="2" presetClass="exit" presetSubtype="2" fill="hold" nodeType="clickEffect">
+                                  <p:stCondLst>
+                                    <p:cond delay="0"/>
+                                  </p:stCondLst>
+                                  <p:childTnLst>
+                                    <p:anim calcmode="lin" valueType="num">
+                                      <p:cBhvr additive="base">
+                                        <p:cTn id="12" dur="500"/>
+                                        <p:tgtEl>
+                                          <p:spTgt spid="2050"/>
+                                        </p:tgtEl>
+                                        <p:attrNameLst>
+                                          <p:attrName>ppt_x</p:attrName>
+                                        </p:attrNameLst>
+                                      </p:cBhvr>
+                                      <p:tavLst>
+                                        <p:tav tm="0">
+                                          <p:val>
+                                            <p:strVal val="ppt_x"/>
+                                          </p:val>
+                                        </p:tav>
+                                        <p:tav tm="100000">
+                                          <p:val>
+                                            <p:strVal val="1+ppt_w/2"/>
+                                          </p:val>
+                                        </p:tav>
+                                      </p:tavLst>
+                                    </p:anim>
+                                    <p:anim calcmode="lin" valueType="num">
+                                      <p:cBhvr additive="base">
+                                        <p:cTn id="13" dur="500"/>
+                                        <p:tgtEl>
+                                          <p:spTgt spid="2050"/>
+                                        </p:tgtEl>
+                                        <p:attrNameLst>
+                                          <p:attrName>ppt_y</p:attrName>
+                                        </p:attrNameLst>
+                                      </p:cBhvr>
+                                      <p:tavLst>
+                                        <p:tav tm="0">
+                                          <p:val>
+                                            <p:strVal val="ppt_y"/>
+                                          </p:val>
+                                        </p:tav>
+                                        <p:tav tm="100000">
+                                          <p:val>
+                                            <p:strVal val="ppt_y"/>
+                                          </p:val>
+                                        </p:tav>
+                                      </p:tavLst>
+                                    </p:anim>
+                                    <p:set>
+                                      <p:cBhvr>
+                                        <p:cTn id="14" dur="1" fill="hold">
+                                          <p:stCondLst>
+                                            <p:cond delay="499"/>
+                                          </p:stCondLst>
+                                        </p:cTn>
+                                        <p:tgtEl>
+                                          <p:spTgt spid="2050"/>
+                                        </p:tgtEl>
+                                        <p:attrNameLst>
+                                          <p:attrName>style.visibility</p:attrName>
+                                        </p:attrNameLst>
+                                      </p:cBhvr>
+                                      <p:to>
+                                        <p:strVal val="hidden"/>
+                                      </p:to>
+                                    </p:set>
+                                  </p:childTnLst>
+                                </p:cTn>
+                              </p:par>
+                            </p:childTnLst>
+                          </p:cTn>
+                        </p:par>
+                        <p:par>
+                          <p:cTn id="15" fill="hold">
+                            <p:stCondLst>
+                              <p:cond delay="500"/>
+                            </p:stCondLst>
+                            <p:childTnLst>
+                              <p:par>
+                                <p:cTn id="16" presetID="42" presetClass="entr" presetSubtype="0" fill="hold" nodeType="afterEffect">
+                                  <p:stCondLst>
+                                    <p:cond delay="0"/>
+                                  </p:stCondLst>
+                                  <p:childTnLst>
+                                    <p:set>
+                                      <p:cBhvr>
+                                        <p:cTn id="17" dur="1" fill="hold">
+                                          <p:stCondLst>
+                                            <p:cond delay="0"/>
+                                          </p:stCondLst>
+                                        </p:cTn>
+                                        <p:tgtEl>
+                                          <p:spTgt spid="2051"/>
+                                        </p:tgtEl>
+                                        <p:attrNameLst>
+                                          <p:attrName>style.visibility</p:attrName>
+                                        </p:attrNameLst>
+                                      </p:cBhvr>
+                                      <p:to>
+                                        <p:strVal val="visible"/>
+                                      </p:to>
+                                    </p:set>
+                                    <p:animEffect transition="in" filter="fade">
+                                      <p:cBhvr>
+                                        <p:cTn id="18" dur="1000"/>
+                                        <p:tgtEl>
+                                          <p:spTgt spid="2051"/>
+                                        </p:tgtEl>
+                                      </p:cBhvr>
+                                    </p:animEffect>
+                                    <p:anim calcmode="lin" valueType="num">
+                                      <p:cBhvr>
+                                        <p:cTn id="19" dur="1000" fill="hold"/>
+                                        <p:tgtEl>
+                                          <p:spTgt spid="2051"/>
+                                        </p:tgtEl>
+                                        <p:attrNameLst>
+                                          <p:attrName>ppt_x</p:attrName>
+                                        </p:attrNameLst>
+                                      </p:cBhvr>
+                                      <p:tavLst>
+                                        <p:tav tm="0">
+                                          <p:val>
+                                            <p:strVal val="#ppt_x"/>
+                                          </p:val>
+                                        </p:tav>
+                                        <p:tav tm="100000">
+                                          <p:val>
+                                            <p:strVal val="#ppt_x"/>
+                                          </p:val>
+                                        </p:tav>
+                                      </p:tavLst>
+                                    </p:anim>
+                                    <p:anim calcmode="lin" valueType="num">
+                                      <p:cBhvr>
+                                        <p:cTn id="20" dur="1000" fill="hold"/>
+                                        <p:tgtEl>
+                                          <p:spTgt spid="2051"/>
+                                        </p:tgtEl>
+                                        <p:attrNameLst>
+                                          <p:attrName>ppt_y</p:attrName>
+                                        </p:attrNameLst>
+                                      </p:cBhvr>
+                                      <p:tavLst>
+                                        <p:tav tm="0">
+                                          <p:val>
+                                            <p:strVal val="#ppt_y+.1"/>
+                                          </p:val>
+                                        </p:tav>
+                                        <p:tav tm="100000">
+                                          <p:val>
+                                            <p:strVal val="#ppt_y"/>
+                                          </p:val>
+                                        </p:tav>
+                                      </p:tavLst>
+                                    </p:anim>
+                                  </p:childTnLst>
+                                </p:cTn>
+                              </p:par>
+                            </p:childTnLst>
+                          </p:cTn>
+                        </p:par>
+                      </p:childTnLst>
+                    </p:cTn>
+                  </p:par>
+                  <p:par>
+                    <p:cTn id="21" fill="hold">
+                      <p:stCondLst>
+                        <p:cond delay="indefinite"/>
+                      </p:stCondLst>
+                      <p:childTnLst>
+                        <p:par>
+                          <p:cTn id="22" fill="hold">
+                            <p:stCondLst>
+                              <p:cond delay="0"/>
+                            </p:stCondLst>
+                            <p:childTnLst>
+                              <p:par>
+                                <p:cTn id="23" presetID="10" presetClass="exit" presetSubtype="0" fill="hold" nodeType="clickEffect">
+                                  <p:stCondLst>
+                                    <p:cond delay="0"/>
+                                  </p:stCondLst>
+                                  <p:childTnLst>
+                                    <p:animEffect transition="out" filter="fade">
+                                      <p:cBhvr>
+                                        <p:cTn id="24" dur="500"/>
+                                        <p:tgtEl>
+                                          <p:spTgt spid="2051"/>
+                                        </p:tgtEl>
+                                      </p:cBhvr>
+                                    </p:animEffect>
+                                    <p:set>
+                                      <p:cBhvr>
+                                        <p:cTn id="25" dur="1" fill="hold">
+                                          <p:stCondLst>
+                                            <p:cond delay="499"/>
+                                          </p:stCondLst>
+                                        </p:cTn>
+                                        <p:tgtEl>
+                                          <p:spTgt spid="2051"/>
+                                        </p:tgtEl>
+                                        <p:attrNameLst>
+                                          <p:attrName>style.visibility</p:attrName>
+                                        </p:attrNameLst>
+                                      </p:cBhvr>
+                                      <p:to>
+                                        <p:strVal val="hidden"/>
+                                      </p:to>
+                                    </p:set>
+                                  </p:childTnLst>
+                                </p:cTn>
+                              </p:par>
+                            </p:childTnLst>
+                          </p:cTn>
+                        </p:par>
+                      </p:childTnLst>
+                    </p:cTn>
+                  </p:par>
+                </p:childTnLst>
+              </p:cTn>
+              <p:prevCondLst>
+                <p:cond evt="onPrev" delay="0">
+                  <p:tgtEl>
+                    <p:sldTgt/>
+                  </p:tgtEl>
+                </p:cond>
+              </p:prevCondLst>
+              <p:nextCondLst>
+                <p:cond evt="onNext" delay="0">
+                  <p:tgtEl>
+                    <p:sldTgt/>
+                  </p:tgtEl>
+                </p:cond>
+              </p:nextCondLst>
+            </p:seq>
+          </p:childTnLst>
+        </p:cTn>
       </p:par>
     </p:tnLst>
   </p:timing>
@@ -4334,8 +4944,28 @@
               <a:buChar char="•"/>
             </a:pPr>
             <a:r>
-              <a:rPr lang="de-CH" smtClean="0"/>
+              <a:rPr lang="de-CH" dirty="0" smtClean="0"/>
               <a:t>Zielnote berechnen</a:t>
+            </a:r>
+          </a:p>
+          <a:p>
+            <a:pPr marL="285750" indent="-285750">
+              <a:buFont typeface="Arial" pitchFamily="34" charset="0"/>
+              <a:buChar char="•"/>
+            </a:pPr>
+            <a:r>
+              <a:rPr lang="de-CH" dirty="0" smtClean="0"/>
+              <a:t>Grafik</a:t>
+            </a:r>
+          </a:p>
+          <a:p>
+            <a:pPr marL="285750" indent="-285750">
+              <a:buFont typeface="Arial" pitchFamily="34" charset="0"/>
+              <a:buChar char="•"/>
+            </a:pPr>
+            <a:r>
+              <a:rPr lang="de-CH" dirty="0" smtClean="0"/>
+              <a:t>Voci-Trainer</a:t>
             </a:r>
           </a:p>
           <a:p>
@@ -4370,10 +5000,872 @@
           </a:p>
         </p:txBody>
       </p:sp>
+      <p:pic>
+        <p:nvPicPr>
+          <p:cNvPr id="3074" name="Picture 2" descr="C:\Private\Jens\Programing\SchuelerOffice\SchuelerOffice\res\TrainerForm.png"/>
+          <p:cNvPicPr>
+            <a:picLocks noChangeAspect="1" noChangeArrowheads="1"/>
+          </p:cNvPicPr>
+          <p:nvPr/>
+        </p:nvPicPr>
+        <p:blipFill>
+          <a:blip r:embed="rId2">
+            <a:extLst>
+              <a:ext uri="{28A0092B-C50C-407E-A947-70E740481C1C}">
+                <a14:useLocalDpi xmlns:a14="http://schemas.microsoft.com/office/drawing/2010/main" val="0"/>
+              </a:ext>
+            </a:extLst>
+          </a:blip>
+          <a:srcRect/>
+          <a:stretch>
+            <a:fillRect/>
+          </a:stretch>
+        </p:blipFill>
+        <p:spPr bwMode="auto">
+          <a:xfrm>
+            <a:off x="5148064" y="908720"/>
+            <a:ext cx="3114675" cy="3543300"/>
+          </a:xfrm>
+          <a:prstGeom prst="rect">
+            <a:avLst/>
+          </a:prstGeom>
+          <a:noFill/>
+          <a:extLst>
+            <a:ext uri="{909E8E84-426E-40DD-AFC4-6F175D3DCCD1}">
+              <a14:hiddenFill xmlns:a14="http://schemas.microsoft.com/office/drawing/2010/main">
+                <a:solidFill>
+                  <a:srgbClr val="FFFFFF"/>
+                </a:solidFill>
+              </a14:hiddenFill>
+            </a:ext>
+          </a:extLst>
+        </p:spPr>
+      </p:pic>
+      <p:pic>
+        <p:nvPicPr>
+          <p:cNvPr id="3075" name="Picture 3" descr="C:\Private\Jens\Programing\SchuelerOffice\SchuelerOffice\res\GraphForm.png"/>
+          <p:cNvPicPr>
+            <a:picLocks noChangeAspect="1" noChangeArrowheads="1"/>
+          </p:cNvPicPr>
+          <p:nvPr/>
+        </p:nvPicPr>
+        <p:blipFill>
+          <a:blip r:embed="rId3">
+            <a:extLst>
+              <a:ext uri="{28A0092B-C50C-407E-A947-70E740481C1C}">
+                <a14:useLocalDpi xmlns:a14="http://schemas.microsoft.com/office/drawing/2010/main" val="0"/>
+              </a:ext>
+            </a:extLst>
+          </a:blip>
+          <a:srcRect/>
+          <a:stretch>
+            <a:fillRect/>
+          </a:stretch>
+        </p:blipFill>
+        <p:spPr bwMode="auto">
+          <a:xfrm>
+            <a:off x="395536" y="3053780"/>
+            <a:ext cx="4598894" cy="2708920"/>
+          </a:xfrm>
+          <a:prstGeom prst="rect">
+            <a:avLst/>
+          </a:prstGeom>
+          <a:noFill/>
+          <a:extLst>
+            <a:ext uri="{909E8E84-426E-40DD-AFC4-6F175D3DCCD1}">
+              <a14:hiddenFill xmlns:a14="http://schemas.microsoft.com/office/drawing/2010/main">
+                <a:solidFill>
+                  <a:srgbClr val="FFFFFF"/>
+                </a:solidFill>
+              </a14:hiddenFill>
+            </a:ext>
+          </a:extLst>
+        </p:spPr>
+      </p:pic>
+      <p:sp>
+        <p:nvSpPr>
+          <p:cNvPr id="4" name="TextBox 3"/>
+          <p:cNvSpPr txBox="1"/>
+          <p:nvPr/>
+        </p:nvSpPr>
+        <p:spPr>
+          <a:xfrm>
+            <a:off x="26690" y="0"/>
+            <a:ext cx="9117310" cy="16158270"/>
+          </a:xfrm>
+          <a:prstGeom prst="rect">
+            <a:avLst/>
+          </a:prstGeom>
+          <a:noFill/>
+        </p:spPr>
+        <p:txBody>
+          <a:bodyPr wrap="square" rtlCol="0">
+            <a:spAutoFit/>
+          </a:bodyPr>
+          <a:lstStyle/>
+          <a:p>
+            <a:r>
+              <a:rPr lang="de-CH" dirty="0"/>
+              <a:t> private void button_calcuteTargetMark_Click(object sender, EventArgs e)</a:t>
+            </a:r>
+          </a:p>
+          <a:p>
+            <a:r>
+              <a:rPr lang="de-CH" dirty="0"/>
+              <a:t>        {</a:t>
+            </a:r>
+          </a:p>
+          <a:p>
+            <a:r>
+              <a:rPr lang="de-CH" dirty="0"/>
+              <a:t>            if (textBox_targetMark.Text != "")</a:t>
+            </a:r>
+          </a:p>
+          <a:p>
+            <a:r>
+              <a:rPr lang="de-CH" dirty="0"/>
+              <a:t>            {</a:t>
+            </a:r>
+          </a:p>
+          <a:p>
+            <a:r>
+              <a:rPr lang="de-CH" dirty="0"/>
+              <a:t>                try</a:t>
+            </a:r>
+          </a:p>
+          <a:p>
+            <a:r>
+              <a:rPr lang="de-CH" dirty="0"/>
+              <a:t>                {</a:t>
+            </a:r>
+          </a:p>
+          <a:p>
+            <a:r>
+              <a:rPr lang="de-CH" dirty="0"/>
+              <a:t>                    float target = Convert.ToSingle(textBox_targetMark.Text);</a:t>
+            </a:r>
+          </a:p>
+          <a:p>
+            <a:r>
+              <a:rPr lang="en-US" dirty="0"/>
+              <a:t>                    if (target &gt; 6 || target &lt; 1)</a:t>
+            </a:r>
+          </a:p>
+          <a:p>
+            <a:r>
+              <a:rPr lang="de-CH" dirty="0"/>
+              <a:t>                    {</a:t>
+            </a:r>
+          </a:p>
+          <a:p>
+            <a:r>
+              <a:rPr lang="de-CH" dirty="0"/>
+              <a:t>                        Data.messageBox("Warnung!", "Ungültige eingabe!");</a:t>
+            </a:r>
+          </a:p>
+          <a:p>
+            <a:r>
+              <a:rPr lang="de-CH" dirty="0"/>
+              <a:t>                    }</a:t>
+            </a:r>
+          </a:p>
+          <a:p>
+            <a:r>
+              <a:rPr lang="de-CH" dirty="0"/>
+              <a:t>                    else</a:t>
+            </a:r>
+          </a:p>
+          <a:p>
+            <a:r>
+              <a:rPr lang="de-CH" dirty="0"/>
+              <a:t>                    {</a:t>
+            </a:r>
+          </a:p>
+          <a:p>
+            <a:r>
+              <a:rPr lang="de-CH" dirty="0"/>
+              <a:t>                        float total = 0;</a:t>
+            </a:r>
+          </a:p>
+          <a:p>
+            <a:r>
+              <a:rPr lang="de-CH" dirty="0"/>
+              <a:t>                        int i = 0;</a:t>
+            </a:r>
+          </a:p>
+          <a:p>
+            <a:r>
+              <a:rPr lang="de-CH" dirty="0"/>
+              <a:t>                        foreach (Mark m in Data.marks)</a:t>
+            </a:r>
+          </a:p>
+          <a:p>
+            <a:r>
+              <a:rPr lang="de-CH" dirty="0"/>
+              <a:t>                        {</a:t>
+            </a:r>
+          </a:p>
+          <a:p>
+            <a:r>
+              <a:rPr lang="de-CH" dirty="0"/>
+              <a:t>                            if (m._class == comboBox_classes.Text)</a:t>
+            </a:r>
+          </a:p>
+          <a:p>
+            <a:r>
+              <a:rPr lang="de-CH" dirty="0"/>
+              <a:t>                            {</a:t>
+            </a:r>
+          </a:p>
+          <a:p>
+            <a:r>
+              <a:rPr lang="de-CH" dirty="0"/>
+              <a:t>                                i++;</a:t>
+            </a:r>
+          </a:p>
+          <a:p>
+            <a:r>
+              <a:rPr lang="de-CH" dirty="0"/>
+              <a:t>                                total = total + m.mark;</a:t>
+            </a:r>
+          </a:p>
+          <a:p>
+            <a:r>
+              <a:rPr lang="de-CH" dirty="0"/>
+              <a:t>                            }</a:t>
+            </a:r>
+          </a:p>
+          <a:p>
+            <a:r>
+              <a:rPr lang="de-CH" dirty="0"/>
+              <a:t>                        }</a:t>
+            </a:r>
+          </a:p>
+          <a:p>
+            <a:r>
+              <a:rPr lang="de-CH" dirty="0"/>
+              <a:t>                        if (i != 0)</a:t>
+            </a:r>
+          </a:p>
+          <a:p>
+            <a:r>
+              <a:rPr lang="de-CH" dirty="0"/>
+              <a:t>                        {</a:t>
+            </a:r>
+          </a:p>
+          <a:p>
+            <a:r>
+              <a:rPr lang="en-US" dirty="0"/>
+              <a:t>                            float </a:t>
+            </a:r>
+            <a:r>
+              <a:rPr lang="en-US" dirty="0" err="1"/>
+              <a:t>targetMark</a:t>
+            </a:r>
+            <a:r>
+              <a:rPr lang="en-US" dirty="0"/>
+              <a:t> = target * </a:t>
+            </a:r>
+            <a:r>
+              <a:rPr lang="en-US" dirty="0" err="1"/>
+              <a:t>i</a:t>
+            </a:r>
+            <a:r>
+              <a:rPr lang="en-US" dirty="0"/>
+              <a:t> + target - total;</a:t>
+            </a:r>
+          </a:p>
+          <a:p>
+            <a:r>
+              <a:rPr lang="de-CH" dirty="0"/>
+              <a:t>                            float[] targetMarks = new float[20];</a:t>
+            </a:r>
+          </a:p>
+          <a:p>
+            <a:r>
+              <a:rPr lang="de-CH" dirty="0"/>
+              <a:t>                            int j = 0;</a:t>
+            </a:r>
+          </a:p>
+          <a:p>
+            <a:r>
+              <a:rPr lang="de-CH" dirty="0"/>
+              <a:t>                            while (targetMark &gt; 6)</a:t>
+            </a:r>
+          </a:p>
+          <a:p>
+            <a:r>
+              <a:rPr lang="de-CH" dirty="0"/>
+              <a:t>                            {</a:t>
+            </a:r>
+          </a:p>
+          <a:p>
+            <a:r>
+              <a:rPr lang="de-CH" dirty="0"/>
+              <a:t>                                total = total + 6;</a:t>
+            </a:r>
+          </a:p>
+          <a:p>
+            <a:r>
+              <a:rPr lang="de-CH" dirty="0"/>
+              <a:t>                                i++;</a:t>
+            </a:r>
+          </a:p>
+          <a:p>
+            <a:r>
+              <a:rPr lang="de-CH" dirty="0"/>
+              <a:t>                                targetMark = target * i + target - total;</a:t>
+            </a:r>
+          </a:p>
+          <a:p>
+            <a:r>
+              <a:rPr lang="de-CH" dirty="0"/>
+              <a:t>                                targetMarks[j] = 6;</a:t>
+            </a:r>
+          </a:p>
+          <a:p>
+            <a:r>
+              <a:rPr lang="de-CH" dirty="0"/>
+              <a:t>                                if (j == 19)</a:t>
+            </a:r>
+          </a:p>
+          <a:p>
+            <a:r>
+              <a:rPr lang="de-CH" dirty="0"/>
+              <a:t>                                {</a:t>
+            </a:r>
+          </a:p>
+          <a:p>
+            <a:r>
+              <a:rPr lang="de-CH" dirty="0"/>
+              <a:t>                                    break;</a:t>
+            </a:r>
+          </a:p>
+          <a:p>
+            <a:r>
+              <a:rPr lang="de-CH" dirty="0"/>
+              <a:t>                                }</a:t>
+            </a:r>
+          </a:p>
+          <a:p>
+            <a:r>
+              <a:rPr lang="de-CH" dirty="0"/>
+              <a:t>                                j++;</a:t>
+            </a:r>
+          </a:p>
+          <a:p>
+            <a:r>
+              <a:rPr lang="de-CH" dirty="0"/>
+              <a:t>                            }</a:t>
+            </a:r>
+          </a:p>
+          <a:p>
+            <a:r>
+              <a:rPr lang="de-CH" dirty="0"/>
+              <a:t>                            targetMarks[j] = targetMark;</a:t>
+            </a:r>
+          </a:p>
+          <a:p>
+            <a:r>
+              <a:rPr lang="de-CH" dirty="0"/>
+              <a:t>                            textBox_requiredMark.Text = "";</a:t>
+            </a:r>
+          </a:p>
+          <a:p>
+            <a:r>
+              <a:rPr lang="en-US" dirty="0"/>
+              <a:t>                            </a:t>
+            </a:r>
+            <a:r>
+              <a:rPr lang="en-US" dirty="0" err="1"/>
+              <a:t>foreach</a:t>
+            </a:r>
+            <a:r>
+              <a:rPr lang="en-US" dirty="0"/>
+              <a:t> (float f in </a:t>
+            </a:r>
+            <a:r>
+              <a:rPr lang="en-US" dirty="0" err="1"/>
+              <a:t>targetMarks</a:t>
+            </a:r>
+            <a:r>
+              <a:rPr lang="en-US" dirty="0"/>
+              <a:t>)</a:t>
+            </a:r>
+          </a:p>
+          <a:p>
+            <a:r>
+              <a:rPr lang="de-CH" dirty="0"/>
+              <a:t>                            {</a:t>
+            </a:r>
+          </a:p>
+          <a:p>
+            <a:r>
+              <a:rPr lang="de-CH" dirty="0"/>
+              <a:t>                                if (f != 0)</a:t>
+            </a:r>
+          </a:p>
+          <a:p>
+            <a:r>
+              <a:rPr lang="de-CH" dirty="0"/>
+              <a:t>                                {</a:t>
+            </a:r>
+          </a:p>
+          <a:p>
+            <a:r>
+              <a:rPr lang="de-CH" dirty="0"/>
+              <a:t>                                    textBox_requiredMark.Text = textBox_requiredMark.Text + Convert.ToString(f) + ",";</a:t>
+            </a:r>
+          </a:p>
+          <a:p>
+            <a:r>
+              <a:rPr lang="de-CH" dirty="0"/>
+              <a:t>                                }</a:t>
+            </a:r>
+          </a:p>
+          <a:p>
+            <a:r>
+              <a:rPr lang="de-CH" dirty="0"/>
+              <a:t>                            }</a:t>
+            </a:r>
+          </a:p>
+          <a:p>
+            <a:r>
+              <a:rPr lang="de-CH" dirty="0"/>
+              <a:t>                        }</a:t>
+            </a:r>
+          </a:p>
+          <a:p>
+            <a:r>
+              <a:rPr lang="de-CH" dirty="0"/>
+              <a:t>                    }</a:t>
+            </a:r>
+          </a:p>
+          <a:p>
+            <a:r>
+              <a:rPr lang="de-CH" dirty="0"/>
+              <a:t>                }</a:t>
+            </a:r>
+          </a:p>
+          <a:p>
+            <a:r>
+              <a:rPr lang="de-CH" dirty="0"/>
+              <a:t>                catch</a:t>
+            </a:r>
+          </a:p>
+          <a:p>
+            <a:r>
+              <a:rPr lang="de-CH" dirty="0"/>
+              <a:t>                {</a:t>
+            </a:r>
+          </a:p>
+          <a:p>
+            <a:r>
+              <a:rPr lang="de-CH" dirty="0"/>
+              <a:t>                    Data.messageBox("Warnung!", "Ungültige eingabe!");</a:t>
+            </a:r>
+          </a:p>
+          <a:p>
+            <a:r>
+              <a:rPr lang="de-CH" dirty="0"/>
+              <a:t>                }</a:t>
+            </a:r>
+          </a:p>
+          <a:p>
+            <a:r>
+              <a:rPr lang="de-CH" dirty="0"/>
+              <a:t>            }</a:t>
+            </a:r>
+          </a:p>
+        </p:txBody>
+      </p:sp>
     </p:spTree>
     <p:extLst>
       <p:ext uri="{BB962C8B-B14F-4D97-AF65-F5344CB8AC3E}">
         <p14:creationId xmlns:p14="http://schemas.microsoft.com/office/powerpoint/2010/main" val="700731515"/>
+      </p:ext>
+    </p:extLst>
+  </p:cSld>
+  <p:clrMapOvr>
+    <a:masterClrMapping/>
+  </p:clrMapOvr>
+  <p:timing>
+    <p:tnLst>
+      <p:par>
+        <p:cTn id="1" dur="indefinite" restart="never" nodeType="tmRoot">
+          <p:childTnLst>
+            <p:seq concurrent="1" nextAc="seek">
+              <p:cTn id="2" dur="indefinite" nodeType="mainSeq">
+                <p:childTnLst>
+                  <p:par>
+                    <p:cTn id="3" fill="hold">
+                      <p:stCondLst>
+                        <p:cond delay="indefinite"/>
+                      </p:stCondLst>
+                      <p:childTnLst>
+                        <p:par>
+                          <p:cTn id="4" fill="hold">
+                            <p:stCondLst>
+                              <p:cond delay="0"/>
+                            </p:stCondLst>
+                            <p:childTnLst>
+                              <p:par>
+                                <p:cTn id="5" presetID="10" presetClass="entr" presetSubtype="0" fill="hold" grpId="0" nodeType="clickEffect">
+                                  <p:stCondLst>
+                                    <p:cond delay="0"/>
+                                  </p:stCondLst>
+                                  <p:childTnLst>
+                                    <p:set>
+                                      <p:cBhvr>
+                                        <p:cTn id="6" dur="1" fill="hold">
+                                          <p:stCondLst>
+                                            <p:cond delay="0"/>
+                                          </p:stCondLst>
+                                        </p:cTn>
+                                        <p:tgtEl>
+                                          <p:spTgt spid="4"/>
+                                        </p:tgtEl>
+                                        <p:attrNameLst>
+                                          <p:attrName>style.visibility</p:attrName>
+                                        </p:attrNameLst>
+                                      </p:cBhvr>
+                                      <p:to>
+                                        <p:strVal val="visible"/>
+                                      </p:to>
+                                    </p:set>
+                                    <p:animEffect transition="in" filter="fade">
+                                      <p:cBhvr>
+                                        <p:cTn id="7" dur="500"/>
+                                        <p:tgtEl>
+                                          <p:spTgt spid="4"/>
+                                        </p:tgtEl>
+                                      </p:cBhvr>
+                                    </p:animEffect>
+                                  </p:childTnLst>
+                                </p:cTn>
+                              </p:par>
+                            </p:childTnLst>
+                          </p:cTn>
+                        </p:par>
+                      </p:childTnLst>
+                    </p:cTn>
+                  </p:par>
+                  <p:par>
+                    <p:cTn id="8" fill="hold">
+                      <p:stCondLst>
+                        <p:cond delay="indefinite"/>
+                      </p:stCondLst>
+                      <p:childTnLst>
+                        <p:par>
+                          <p:cTn id="9" fill="hold">
+                            <p:stCondLst>
+                              <p:cond delay="0"/>
+                            </p:stCondLst>
+                            <p:childTnLst>
+                              <p:par>
+                                <p:cTn id="10" presetID="42" presetClass="path" presetSubtype="0" accel="50000" decel="50000" fill="hold" grpId="1" nodeType="clickEffect">
+                                  <p:stCondLst>
+                                    <p:cond delay="0"/>
+                                  </p:stCondLst>
+                                  <p:childTnLst>
+                                    <p:animMotion origin="layout" path="M 1.11111E-6 7.40741E-7 L -0.00139 -1.45509 " pathEditMode="relative" rAng="0" ptsTypes="AA">
+                                      <p:cBhvr>
+                                        <p:cTn id="11" dur="5000" fill="hold"/>
+                                        <p:tgtEl>
+                                          <p:spTgt spid="4"/>
+                                        </p:tgtEl>
+                                        <p:attrNameLst>
+                                          <p:attrName>ppt_x</p:attrName>
+                                          <p:attrName>ppt_y</p:attrName>
+                                        </p:attrNameLst>
+                                      </p:cBhvr>
+                                      <p:rCtr x="-69" y="-72755"/>
+                                    </p:animMotion>
+                                  </p:childTnLst>
+                                </p:cTn>
+                              </p:par>
+                            </p:childTnLst>
+                          </p:cTn>
+                        </p:par>
+                      </p:childTnLst>
+                    </p:cTn>
+                  </p:par>
+                  <p:par>
+                    <p:cTn id="12" fill="hold">
+                      <p:stCondLst>
+                        <p:cond delay="indefinite"/>
+                      </p:stCondLst>
+                      <p:childTnLst>
+                        <p:par>
+                          <p:cTn id="13" fill="hold">
+                            <p:stCondLst>
+                              <p:cond delay="0"/>
+                            </p:stCondLst>
+                            <p:childTnLst>
+                              <p:par>
+                                <p:cTn id="14" presetID="10" presetClass="exit" presetSubtype="0" fill="hold" grpId="2" nodeType="clickEffect">
+                                  <p:stCondLst>
+                                    <p:cond delay="0"/>
+                                  </p:stCondLst>
+                                  <p:childTnLst>
+                                    <p:animEffect transition="out" filter="fade">
+                                      <p:cBhvr>
+                                        <p:cTn id="15" dur="500"/>
+                                        <p:tgtEl>
+                                          <p:spTgt spid="4"/>
+                                        </p:tgtEl>
+                                      </p:cBhvr>
+                                    </p:animEffect>
+                                    <p:set>
+                                      <p:cBhvr>
+                                        <p:cTn id="16" dur="1" fill="hold">
+                                          <p:stCondLst>
+                                            <p:cond delay="499"/>
+                                          </p:stCondLst>
+                                        </p:cTn>
+                                        <p:tgtEl>
+                                          <p:spTgt spid="4"/>
+                                        </p:tgtEl>
+                                        <p:attrNameLst>
+                                          <p:attrName>style.visibility</p:attrName>
+                                        </p:attrNameLst>
+                                      </p:cBhvr>
+                                      <p:to>
+                                        <p:strVal val="hidden"/>
+                                      </p:to>
+                                    </p:set>
+                                  </p:childTnLst>
+                                </p:cTn>
+                              </p:par>
+                            </p:childTnLst>
+                          </p:cTn>
+                        </p:par>
+                      </p:childTnLst>
+                    </p:cTn>
+                  </p:par>
+                </p:childTnLst>
+              </p:cTn>
+              <p:prevCondLst>
+                <p:cond evt="onPrev" delay="0">
+                  <p:tgtEl>
+                    <p:sldTgt/>
+                  </p:tgtEl>
+                </p:cond>
+              </p:prevCondLst>
+              <p:nextCondLst>
+                <p:cond evt="onNext" delay="0">
+                  <p:tgtEl>
+                    <p:sldTgt/>
+                  </p:tgtEl>
+                </p:cond>
+              </p:nextCondLst>
+            </p:seq>
+          </p:childTnLst>
+        </p:cTn>
+      </p:par>
+    </p:tnLst>
+    <p:bldLst>
+      <p:bldP spid="4" grpId="0"/>
+      <p:bldP spid="4" grpId="1"/>
+      <p:bldP spid="4" grpId="2"/>
+    </p:bldLst>
+  </p:timing>
+</p:sld>
+</file>
+
+<file path=ppt/slides/slide5.xml><?xml version="1.0" encoding="utf-8"?>
+<p:sld xmlns:a="http://schemas.openxmlformats.org/drawingml/2006/main" xmlns:r="http://schemas.openxmlformats.org/officeDocument/2006/relationships" xmlns:p="http://schemas.openxmlformats.org/presentationml/2006/main">
+  <p:cSld>
+    <p:spTree>
+      <p:nvGrpSpPr>
+        <p:cNvPr id="1" name=""/>
+        <p:cNvGrpSpPr/>
+        <p:nvPr/>
+      </p:nvGrpSpPr>
+      <p:grpSpPr>
+        <a:xfrm>
+          <a:off x="0" y="0"/>
+          <a:ext cx="0" cy="0"/>
+          <a:chOff x="0" y="0"/>
+          <a:chExt cx="0" cy="0"/>
+        </a:xfrm>
+      </p:grpSpPr>
+      <p:sp>
+        <p:nvSpPr>
+          <p:cNvPr id="2" name="Content Placeholder 1"/>
+          <p:cNvSpPr>
+            <a:spLocks noGrp="1"/>
+          </p:cNvSpPr>
+          <p:nvPr>
+            <p:ph sz="quarter" idx="13"/>
+          </p:nvPr>
+        </p:nvSpPr>
+        <p:spPr/>
+        <p:txBody>
+          <a:bodyPr/>
+          <a:lstStyle/>
+          <a:p>
+            <a:endParaRPr lang="de-CH"/>
+          </a:p>
+        </p:txBody>
+      </p:sp>
+      <p:sp>
+        <p:nvSpPr>
+          <p:cNvPr id="3" name="Title 2"/>
+          <p:cNvSpPr>
+            <a:spLocks noGrp="1"/>
+          </p:cNvSpPr>
+          <p:nvPr>
+            <p:ph type="title"/>
+          </p:nvPr>
+        </p:nvSpPr>
+        <p:spPr/>
+        <p:txBody>
+          <a:bodyPr/>
+          <a:lstStyle/>
+          <a:p>
+            <a:r>
+              <a:rPr lang="de-CH" dirty="0" smtClean="0"/>
+              <a:t>Visualisierung</a:t>
+            </a:r>
+            <a:endParaRPr lang="de-CH" dirty="0"/>
+          </a:p>
+        </p:txBody>
+      </p:sp>
+    </p:spTree>
+    <p:extLst>
+      <p:ext uri="{BB962C8B-B14F-4D97-AF65-F5344CB8AC3E}">
+        <p14:creationId xmlns:p14="http://schemas.microsoft.com/office/powerpoint/2010/main" val="2308028193"/>
+      </p:ext>
+    </p:extLst>
+  </p:cSld>
+  <p:clrMapOvr>
+    <a:masterClrMapping/>
+  </p:clrMapOvr>
+  <p:timing>
+    <p:tnLst>
+      <p:par>
+        <p:cTn id="1" dur="indefinite" restart="never" nodeType="tmRoot"/>
+      </p:par>
+    </p:tnLst>
+  </p:timing>
+</p:sld>
+</file>
+
+<file path=ppt/slides/slide6.xml><?xml version="1.0" encoding="utf-8"?>
+<p:sld xmlns:a="http://schemas.openxmlformats.org/drawingml/2006/main" xmlns:r="http://schemas.openxmlformats.org/officeDocument/2006/relationships" xmlns:p="http://schemas.openxmlformats.org/presentationml/2006/main">
+  <p:cSld>
+    <p:spTree>
+      <p:nvGrpSpPr>
+        <p:cNvPr id="1" name=""/>
+        <p:cNvGrpSpPr/>
+        <p:nvPr/>
+      </p:nvGrpSpPr>
+      <p:grpSpPr>
+        <a:xfrm>
+          <a:off x="0" y="0"/>
+          <a:ext cx="0" cy="0"/>
+          <a:chOff x="0" y="0"/>
+          <a:chExt cx="0" cy="0"/>
+        </a:xfrm>
+      </p:grpSpPr>
+      <p:sp>
+        <p:nvSpPr>
+          <p:cNvPr id="2" name="Content Placeholder 1"/>
+          <p:cNvSpPr>
+            <a:spLocks noGrp="1"/>
+          </p:cNvSpPr>
+          <p:nvPr>
+            <p:ph sz="quarter" idx="13"/>
+          </p:nvPr>
+        </p:nvSpPr>
+        <p:spPr/>
+        <p:txBody>
+          <a:bodyPr/>
+          <a:lstStyle/>
+          <a:p>
+            <a:r>
+              <a:rPr lang="de-CH" dirty="0" smtClean="0"/>
+              <a:t>Download: </a:t>
+            </a:r>
+            <a:r>
+              <a:rPr lang="de-CH" dirty="0" smtClean="0">
+                <a:hlinkClick r:id="rId2"/>
+              </a:rPr>
+              <a:t>http://so.northcode.no/</a:t>
+            </a:r>
+            <a:endParaRPr lang="de-CH" dirty="0" smtClean="0"/>
+          </a:p>
+          <a:p>
+            <a:r>
+              <a:rPr lang="de-CH" dirty="0"/>
+              <a:t>Source: </a:t>
+            </a:r>
+            <a:r>
+              <a:rPr lang="de-CH" dirty="0">
+                <a:hlinkClick r:id="rId3"/>
+              </a:rPr>
+              <a:t>https://</a:t>
+            </a:r>
+            <a:r>
+              <a:rPr lang="de-CH" dirty="0" smtClean="0">
+                <a:hlinkClick r:id="rId3"/>
+              </a:rPr>
+              <a:t>github.com/Jenjen1324/SchuelerOffice</a:t>
+            </a:r>
+            <a:endParaRPr lang="de-CH" dirty="0" smtClean="0"/>
+          </a:p>
+          <a:p>
+            <a:r>
+              <a:rPr lang="de-CH" dirty="0"/>
+              <a:t>Wiki: </a:t>
+            </a:r>
+            <a:r>
+              <a:rPr lang="de-CH" dirty="0">
+                <a:hlinkClick r:id="rId4"/>
+              </a:rPr>
+              <a:t>https://</a:t>
+            </a:r>
+            <a:r>
+              <a:rPr lang="de-CH" dirty="0" smtClean="0">
+                <a:hlinkClick r:id="rId4"/>
+              </a:rPr>
+              <a:t>github.com/Jenjen1324/SchuelerOffice/wiki</a:t>
+            </a:r>
+            <a:endParaRPr lang="de-CH" dirty="0" smtClean="0"/>
+          </a:p>
+          <a:p>
+            <a:endParaRPr lang="de-CH" dirty="0"/>
+          </a:p>
+        </p:txBody>
+      </p:sp>
+      <p:sp>
+        <p:nvSpPr>
+          <p:cNvPr id="3" name="Title 2"/>
+          <p:cNvSpPr>
+            <a:spLocks noGrp="1"/>
+          </p:cNvSpPr>
+          <p:nvPr>
+            <p:ph type="title"/>
+          </p:nvPr>
+        </p:nvSpPr>
+        <p:spPr/>
+        <p:txBody>
+          <a:bodyPr/>
+          <a:lstStyle/>
+          <a:p>
+            <a:r>
+              <a:rPr lang="de-CH" dirty="0" smtClean="0"/>
+              <a:t>Danke fürs zuhören</a:t>
+            </a:r>
+            <a:endParaRPr lang="de-CH" dirty="0"/>
+          </a:p>
+        </p:txBody>
+      </p:sp>
+    </p:spTree>
+    <p:extLst>
+      <p:ext uri="{BB962C8B-B14F-4D97-AF65-F5344CB8AC3E}">
+        <p14:creationId xmlns:p14="http://schemas.microsoft.com/office/powerpoint/2010/main" val="1708913882"/>
       </p:ext>
     </p:extLst>
   </p:cSld>

</xml_diff>